<commit_message>
added html form samples
</commit_message>
<xml_diff>
--- a/AttendanceTracker/Web Adresi.pptx
+++ b/AttendanceTracker/Web Adresi.pptx
@@ -5,7 +5,7 @@
     <p:sldMasterId id="2147483648" r:id="rId1"/>
   </p:sldMasterIdLst>
   <p:notesMasterIdLst>
-    <p:notesMasterId r:id="rId34"/>
+    <p:notesMasterId r:id="rId35"/>
   </p:notesMasterIdLst>
   <p:sldIdLst>
     <p:sldId id="288" r:id="rId2"/>
@@ -35,11 +35,12 @@
     <p:sldId id="285" r:id="rId26"/>
     <p:sldId id="286" r:id="rId27"/>
     <p:sldId id="287" r:id="rId28"/>
-    <p:sldId id="289" r:id="rId29"/>
-    <p:sldId id="278" r:id="rId30"/>
-    <p:sldId id="279" r:id="rId31"/>
-    <p:sldId id="261" r:id="rId32"/>
-    <p:sldId id="277" r:id="rId33"/>
+    <p:sldId id="292" r:id="rId29"/>
+    <p:sldId id="289" r:id="rId30"/>
+    <p:sldId id="278" r:id="rId31"/>
+    <p:sldId id="279" r:id="rId32"/>
+    <p:sldId id="261" r:id="rId33"/>
+    <p:sldId id="277" r:id="rId34"/>
   </p:sldIdLst>
   <p:sldSz cx="9144000" cy="6858000" type="screen4x3"/>
   <p:notesSz cx="6858000" cy="9144000"/>
@@ -223,7 +224,7 @@
           <a:p>
             <a:fld id="{64B62F89-0884-4240-9CE5-9A2E3DB8BDF8}" type="datetimeFigureOut">
               <a:rPr lang="tr-TR" smtClean="0"/>
-              <a:t>14.4.2015</a:t>
+              <a:t>17.4.2015</a:t>
             </a:fld>
             <a:endParaRPr lang="tr-TR"/>
           </a:p>
@@ -1892,17 +1893,7 @@
                   </a:schemeClr>
                 </a:solidFill>
               </a:rPr>
-              <a:t> </a:t>
-            </a:r>
-            <a:r>
-              <a:rPr lang="tr-TR" sz="1200" b="0" dirty="0" smtClean="0">
-                <a:solidFill>
-                  <a:schemeClr val="accent3">
-                    <a:lumMod val="75000"/>
-                  </a:schemeClr>
-                </a:solidFill>
-              </a:rPr>
-              <a:t>(</a:t>
+              <a:t> (</a:t>
             </a:r>
             <a:r>
               <a:rPr lang="tr-TR" sz="1200" b="0" i="0" u="none" strike="noStrike" kern="1200" dirty="0" smtClean="0">
@@ -2164,17 +2155,7 @@
                   </a:schemeClr>
                 </a:solidFill>
               </a:rPr>
-              <a:t>http</a:t>
-            </a:r>
-            <a:r>
-              <a:rPr lang="tr-TR" sz="1200" b="0" dirty="0" smtClean="0">
-                <a:solidFill>
-                  <a:schemeClr val="accent3">
-                    <a:lumMod val="75000"/>
-                  </a:schemeClr>
-                </a:solidFill>
-              </a:rPr>
-              <a:t>://www.iana.org/assignments/service-names-port-numbers/service-names-port-numbers.xhtml</a:t>
+              <a:t>http://www.iana.org/assignments/service-names-port-numbers/service-names-port-numbers.xhtml</a:t>
             </a:r>
           </a:p>
         </p:txBody>
@@ -3343,15 +3324,7 @@
             </a:pPr>
             <a:r>
               <a:rPr lang="tr-TR" baseline="0" dirty="0" smtClean="0"/>
-              <a:t>Internet trafiğini yöneten </a:t>
-            </a:r>
-            <a:r>
-              <a:rPr lang="tr-TR" baseline="0" dirty="0" smtClean="0"/>
-              <a:t>yönlendirici </a:t>
-            </a:r>
-            <a:r>
-              <a:rPr lang="tr-TR" baseline="0" dirty="0" smtClean="0"/>
-              <a:t>donanımlar (</a:t>
+              <a:t>Internet trafiğini yöneten yönlendirici donanımlar (</a:t>
             </a:r>
             <a:r>
               <a:rPr lang="tr-TR" b="1" baseline="0" dirty="0" err="1" smtClean="0"/>
@@ -3915,7 +3888,15 @@
                   <a:srgbClr val="7030A0"/>
                 </a:solidFill>
               </a:rPr>
-              <a:t> adlı fiziksel sunucuya </a:t>
+              <a:t> adlı fiziksel sunucuya (</a:t>
+            </a:r>
+            <a:r>
+              <a:rPr lang="tr-TR" sz="1200" b="1" baseline="0" dirty="0" err="1" smtClean="0">
+                <a:solidFill>
+                  <a:srgbClr val="7030A0"/>
+                </a:solidFill>
+              </a:rPr>
+              <a:t>host</a:t>
             </a:r>
             <a:r>
               <a:rPr lang="tr-TR" sz="1200" b="0" baseline="0" dirty="0" smtClean="0">
@@ -3923,31 +3904,7 @@
                   <a:srgbClr val="7030A0"/>
                 </a:solidFill>
               </a:rPr>
-              <a:t>(</a:t>
-            </a:r>
-            <a:r>
-              <a:rPr lang="tr-TR" sz="1200" b="1" baseline="0" dirty="0" err="1" smtClean="0">
-                <a:solidFill>
-                  <a:srgbClr val="7030A0"/>
-                </a:solidFill>
-              </a:rPr>
-              <a:t>host</a:t>
-            </a:r>
-            <a:r>
-              <a:rPr lang="tr-TR" sz="1200" b="0" baseline="0" dirty="0" smtClean="0">
-                <a:solidFill>
-                  <a:srgbClr val="7030A0"/>
-                </a:solidFill>
-              </a:rPr>
-              <a:t>) karşılık </a:t>
-            </a:r>
-            <a:r>
-              <a:rPr lang="tr-TR" sz="1200" b="0" baseline="0" dirty="0" smtClean="0">
-                <a:solidFill>
-                  <a:srgbClr val="7030A0"/>
-                </a:solidFill>
-              </a:rPr>
-              <a:t>gelir.</a:t>
+              <a:t>) karşılık gelir.</a:t>
             </a:r>
           </a:p>
           <a:p>
@@ -4409,7 +4366,15 @@
                   <a:srgbClr val="7030A0"/>
                 </a:solidFill>
               </a:rPr>
-              <a:t> adlı fiziksel sunucuya </a:t>
+              <a:t> adlı fiziksel sunucuya (</a:t>
+            </a:r>
+            <a:r>
+              <a:rPr lang="tr-TR" sz="1200" b="1" baseline="0" dirty="0" err="1" smtClean="0">
+                <a:solidFill>
+                  <a:srgbClr val="7030A0"/>
+                </a:solidFill>
+              </a:rPr>
+              <a:t>host</a:t>
             </a:r>
             <a:r>
               <a:rPr lang="tr-TR" sz="1200" b="0" baseline="0" dirty="0" smtClean="0">
@@ -4417,31 +4382,7 @@
                   <a:srgbClr val="7030A0"/>
                 </a:solidFill>
               </a:rPr>
-              <a:t>(</a:t>
-            </a:r>
-            <a:r>
-              <a:rPr lang="tr-TR" sz="1200" b="1" baseline="0" dirty="0" err="1" smtClean="0">
-                <a:solidFill>
-                  <a:srgbClr val="7030A0"/>
-                </a:solidFill>
-              </a:rPr>
-              <a:t>host</a:t>
-            </a:r>
-            <a:r>
-              <a:rPr lang="tr-TR" sz="1200" b="0" baseline="0" dirty="0" smtClean="0">
-                <a:solidFill>
-                  <a:srgbClr val="7030A0"/>
-                </a:solidFill>
-              </a:rPr>
-              <a:t>) karşılık </a:t>
-            </a:r>
-            <a:r>
-              <a:rPr lang="tr-TR" sz="1200" b="0" baseline="0" dirty="0" smtClean="0">
-                <a:solidFill>
-                  <a:srgbClr val="7030A0"/>
-                </a:solidFill>
-              </a:rPr>
-              <a:t>gelir</a:t>
+              <a:t>) karşılık gelir</a:t>
             </a:r>
             <a:endParaRPr lang="tr-TR" sz="1200" b="0" dirty="0" smtClean="0">
               <a:solidFill>
@@ -5007,23 +4948,7 @@
                   <a:srgbClr val="7030A0"/>
                 </a:solidFill>
               </a:rPr>
-              <a:t>) </a:t>
-            </a:r>
-            <a:r>
-              <a:rPr lang="tr-TR" sz="1200" b="0" baseline="0" dirty="0" smtClean="0">
-                <a:solidFill>
-                  <a:srgbClr val="7030A0"/>
-                </a:solidFill>
-              </a:rPr>
-              <a:t>atanmış, </a:t>
-            </a:r>
-            <a:r>
-              <a:rPr lang="tr-TR" sz="1200" b="0" baseline="0" dirty="0" smtClean="0">
-                <a:solidFill>
-                  <a:srgbClr val="7030A0"/>
-                </a:solidFill>
-              </a:rPr>
-              <a:t>varsayılan kapı </a:t>
+              <a:t>) atanmış, varsayılan kapı </a:t>
             </a:r>
             <a:r>
               <a:rPr lang="tr-TR" sz="1200" b="0" baseline="0" dirty="0" err="1" smtClean="0">
@@ -5309,23 +5234,7 @@
                   <a:srgbClr val="7030A0"/>
                 </a:solidFill>
               </a:rPr>
-              <a:t>) </a:t>
-            </a:r>
-            <a:r>
-              <a:rPr lang="tr-TR" sz="1200" b="0" baseline="0" dirty="0" smtClean="0">
-                <a:solidFill>
-                  <a:srgbClr val="7030A0"/>
-                </a:solidFill>
-              </a:rPr>
-              <a:t>atanmış, varsayılan </a:t>
-            </a:r>
-            <a:r>
-              <a:rPr lang="tr-TR" sz="1200" b="0" baseline="0" dirty="0" smtClean="0">
-                <a:solidFill>
-                  <a:srgbClr val="7030A0"/>
-                </a:solidFill>
-              </a:rPr>
-              <a:t>kapı </a:t>
+              <a:t>) atanmış, varsayılan kapı </a:t>
             </a:r>
             <a:r>
               <a:rPr lang="tr-TR" sz="1200" b="0" baseline="0" dirty="0" err="1" smtClean="0">
@@ -5846,11 +5755,7 @@
             </a:r>
             <a:r>
               <a:rPr lang="tr-TR" b="0" baseline="0" dirty="0" smtClean="0"/>
-              <a:t>) doğrudan fiziksel sunuculara </a:t>
-            </a:r>
-            <a:r>
-              <a:rPr lang="tr-TR" b="0" baseline="0" dirty="0" smtClean="0"/>
-              <a:t>(</a:t>
+              <a:t>) doğrudan fiziksel sunuculara (</a:t>
             </a:r>
             <a:r>
               <a:rPr lang="tr-TR" b="1" baseline="0" dirty="0" err="1" smtClean="0"/>
@@ -5862,11 +5767,7 @@
             </a:r>
             <a:r>
               <a:rPr lang="tr-TR" b="0" baseline="0" dirty="0" smtClean="0"/>
-              <a:t>sunucu </a:t>
-            </a:r>
-            <a:r>
-              <a:rPr lang="tr-TR" b="0" baseline="0" dirty="0" smtClean="0"/>
-              <a:t>ad ve IP </a:t>
+              <a:t>sunucu ad ve IP </a:t>
             </a:r>
             <a:r>
               <a:rPr lang="tr-TR" b="0" baseline="0" dirty="0" err="1" smtClean="0"/>
@@ -5874,11 +5775,7 @@
             </a:r>
             <a:r>
               <a:rPr lang="tr-TR" b="0" baseline="0" dirty="0" smtClean="0"/>
-              <a:t>) </a:t>
-            </a:r>
-            <a:r>
-              <a:rPr lang="tr-TR" b="0" baseline="0" dirty="0" smtClean="0"/>
-              <a:t>karşılık gelir.</a:t>
+              <a:t>) karşılık gelir.</a:t>
             </a:r>
           </a:p>
           <a:p>
@@ -6039,7 +5936,15 @@
                   <a:srgbClr val="7030A0"/>
                 </a:solidFill>
               </a:rPr>
-              <a:t> IP adresli fiziksel </a:t>
+              <a:t> IP adresli fiziksel sunucuyu (</a:t>
+            </a:r>
+            <a:r>
+              <a:rPr lang="tr-TR" sz="1200" b="1" baseline="0" dirty="0" err="1" smtClean="0">
+                <a:solidFill>
+                  <a:srgbClr val="7030A0"/>
+                </a:solidFill>
+              </a:rPr>
+              <a:t>host</a:t>
             </a:r>
             <a:r>
               <a:rPr lang="tr-TR" sz="1200" b="0" baseline="0" dirty="0" smtClean="0">
@@ -6047,15 +5952,25 @@
                   <a:srgbClr val="7030A0"/>
                 </a:solidFill>
               </a:rPr>
-              <a:t>sunucuyu (</a:t>
-            </a:r>
-            <a:r>
-              <a:rPr lang="tr-TR" sz="1200" b="1" baseline="0" dirty="0" err="1" smtClean="0">
+              <a:t>) bul</a:t>
+            </a:r>
+          </a:p>
+          <a:p>
+            <a:r>
+              <a:rPr lang="tr-TR" sz="1200" b="0" baseline="0" dirty="0" smtClean="0">
                 <a:solidFill>
                   <a:srgbClr val="7030A0"/>
                 </a:solidFill>
               </a:rPr>
-              <a:t>host</a:t>
+              <a:t>2) Sunucuya </a:t>
+            </a:r>
+            <a:r>
+              <a:rPr lang="tr-TR" sz="1200" b="1" baseline="0" dirty="0" smtClean="0">
+                <a:solidFill>
+                  <a:srgbClr val="7030A0"/>
+                </a:solidFill>
+              </a:rPr>
+              <a:t>http </a:t>
             </a:r>
             <a:r>
               <a:rPr lang="tr-TR" sz="1200" b="0" baseline="0" dirty="0" smtClean="0">
@@ -6063,7 +5978,15 @@
                   <a:srgbClr val="7030A0"/>
                 </a:solidFill>
               </a:rPr>
-              <a:t>) </a:t>
+              <a:t>protokolü kullanılarak 80. kapıdan (</a:t>
+            </a:r>
+            <a:r>
+              <a:rPr lang="tr-TR" sz="1200" b="1" baseline="0" dirty="0" smtClean="0">
+                <a:solidFill>
+                  <a:srgbClr val="7030A0"/>
+                </a:solidFill>
+              </a:rPr>
+              <a:t>port</a:t>
             </a:r>
             <a:r>
               <a:rPr lang="tr-TR" sz="1200" b="0" baseline="0" dirty="0" smtClean="0">
@@ -6071,7 +5994,7 @@
                   <a:srgbClr val="7030A0"/>
                 </a:solidFill>
               </a:rPr>
-              <a:t>bul</a:t>
+              <a:t>) ulaş.</a:t>
             </a:r>
           </a:p>
           <a:p>
@@ -6081,7 +6004,7 @@
                   <a:srgbClr val="7030A0"/>
                 </a:solidFill>
               </a:rPr>
-              <a:t>2) Sunucuya </a:t>
+              <a:t>3) </a:t>
             </a:r>
             <a:r>
               <a:rPr lang="tr-TR" sz="1200" b="1" baseline="0" dirty="0" smtClean="0">
@@ -6089,7 +6012,7 @@
                   <a:srgbClr val="7030A0"/>
                 </a:solidFill>
               </a:rPr>
-              <a:t>http </a:t>
+              <a:t>http</a:t>
             </a:r>
             <a:r>
               <a:rPr lang="tr-TR" sz="1200" b="0" baseline="0" dirty="0" smtClean="0">
@@ -6097,7 +6020,7 @@
                   <a:srgbClr val="7030A0"/>
                 </a:solidFill>
               </a:rPr>
-              <a:t>protokolü kullanılarak 80. kapıdan (</a:t>
+              <a:t>  protokolünü kullanarak yolu verilen </a:t>
             </a:r>
             <a:r>
               <a:rPr lang="tr-TR" sz="1200" b="1" baseline="0" dirty="0" smtClean="0">
@@ -6105,7 +6028,7 @@
                   <a:srgbClr val="7030A0"/>
                 </a:solidFill>
               </a:rPr>
-              <a:t>port</a:t>
+              <a:t>/main/index.htm</a:t>
             </a:r>
             <a:r>
               <a:rPr lang="tr-TR" sz="1200" b="0" baseline="0" dirty="0" smtClean="0">
@@ -6113,79 +6036,24 @@
                   <a:srgbClr val="7030A0"/>
                 </a:solidFill>
               </a:rPr>
-              <a:t>) ulaş.</a:t>
-            </a:r>
-          </a:p>
-          <a:p>
+              <a:t>  kaynağı iste (</a:t>
+            </a:r>
+            <a:r>
+              <a:rPr lang="tr-TR" sz="1200" b="1" baseline="0" dirty="0" smtClean="0">
+                <a:solidFill>
+                  <a:srgbClr val="7030A0"/>
+                </a:solidFill>
+              </a:rPr>
+              <a:t>GET</a:t>
+            </a:r>
             <a:r>
               <a:rPr lang="tr-TR" sz="1200" b="0" baseline="0" dirty="0" smtClean="0">
                 <a:solidFill>
                   <a:srgbClr val="7030A0"/>
                 </a:solidFill>
               </a:rPr>
-              <a:t>3) </a:t>
-            </a:r>
-            <a:r>
-              <a:rPr lang="tr-TR" sz="1200" b="1" baseline="0" dirty="0" smtClean="0">
-                <a:solidFill>
-                  <a:srgbClr val="7030A0"/>
-                </a:solidFill>
-              </a:rPr>
-              <a:t>http</a:t>
-            </a:r>
-            <a:r>
-              <a:rPr lang="tr-TR" sz="1200" b="0" baseline="0" dirty="0" smtClean="0">
-                <a:solidFill>
-                  <a:srgbClr val="7030A0"/>
-                </a:solidFill>
-              </a:rPr>
-              <a:t>  protokolünü kullanarak yolu verilen </a:t>
-            </a:r>
-            <a:r>
-              <a:rPr lang="tr-TR" sz="1200" b="1" baseline="0" dirty="0" smtClean="0">
-                <a:solidFill>
-                  <a:srgbClr val="7030A0"/>
-                </a:solidFill>
-              </a:rPr>
-              <a:t>/main/index.htm</a:t>
-            </a:r>
-            <a:r>
-              <a:rPr lang="tr-TR" sz="1200" b="0" baseline="0" dirty="0" smtClean="0">
-                <a:solidFill>
-                  <a:srgbClr val="7030A0"/>
-                </a:solidFill>
-              </a:rPr>
-              <a:t>  kaynağı </a:t>
-            </a:r>
-            <a:r>
-              <a:rPr lang="tr-TR" sz="1200" b="0" baseline="0" dirty="0" smtClean="0">
-                <a:solidFill>
-                  <a:srgbClr val="7030A0"/>
-                </a:solidFill>
-              </a:rPr>
-              <a:t>iste (</a:t>
-            </a:r>
-            <a:r>
-              <a:rPr lang="tr-TR" sz="1200" b="1" baseline="0" dirty="0" smtClean="0">
-                <a:solidFill>
-                  <a:srgbClr val="7030A0"/>
-                </a:solidFill>
-              </a:rPr>
-              <a:t>GET</a:t>
-            </a:r>
-            <a:r>
-              <a:rPr lang="tr-TR" sz="1200" b="0" baseline="0" dirty="0" smtClean="0">
-                <a:solidFill>
-                  <a:srgbClr val="7030A0"/>
-                </a:solidFill>
-              </a:rPr>
               <a:t>).</a:t>
             </a:r>
-            <a:endParaRPr lang="tr-TR" sz="1200" b="0" baseline="0" dirty="0" smtClean="0">
-              <a:solidFill>
-                <a:srgbClr val="7030A0"/>
-              </a:solidFill>
-            </a:endParaRPr>
           </a:p>
           <a:p>
             <a:endParaRPr lang="tr-TR" sz="1200" b="0" dirty="0" smtClean="0">
@@ -6502,7 +6370,7 @@
           <a:p>
             <a:fld id="{B8FE99EC-B6B9-469D-A2EB-8DDD57864557}" type="slidenum">
               <a:rPr lang="tr-TR" smtClean="0"/>
-              <a:t>28</a:t>
+              <a:t>29</a:t>
             </a:fld>
             <a:endParaRPr lang="tr-TR"/>
           </a:p>
@@ -6673,7 +6541,7 @@
           <a:p>
             <a:fld id="{B8FE99EC-B6B9-469D-A2EB-8DDD57864557}" type="slidenum">
               <a:rPr lang="tr-TR" smtClean="0"/>
-              <a:t>29</a:t>
+              <a:t>30</a:t>
             </a:fld>
             <a:endParaRPr lang="tr-TR"/>
           </a:p>
@@ -6908,7 +6776,7 @@
           <a:p>
             <a:fld id="{B8FE99EC-B6B9-469D-A2EB-8DDD57864557}" type="slidenum">
               <a:rPr lang="tr-TR" smtClean="0"/>
-              <a:t>30</a:t>
+              <a:t>31</a:t>
             </a:fld>
             <a:endParaRPr lang="tr-TR"/>
           </a:p>
@@ -7342,7 +7210,7 @@
           <a:p>
             <a:fld id="{B8FE99EC-B6B9-469D-A2EB-8DDD57864557}" type="slidenum">
               <a:rPr lang="tr-TR" smtClean="0"/>
-              <a:t>31</a:t>
+              <a:t>32</a:t>
             </a:fld>
             <a:endParaRPr lang="tr-TR"/>
           </a:p>
@@ -7608,7 +7476,7 @@
           <a:p>
             <a:fld id="{B8FE99EC-B6B9-469D-A2EB-8DDD57864557}" type="slidenum">
               <a:rPr lang="tr-TR" smtClean="0"/>
-              <a:t>32</a:t>
+              <a:t>33</a:t>
             </a:fld>
             <a:endParaRPr lang="tr-TR"/>
           </a:p>
@@ -8991,13 +8859,8 @@
             </a:r>
             <a:r>
               <a:rPr lang="tr-TR" dirty="0" smtClean="0"/>
-              <a:t> </a:t>
-            </a:r>
-            <a:r>
-              <a:rPr lang="tr-TR" dirty="0" smtClean="0"/>
-              <a:t>domain</a:t>
-            </a:r>
-            <a:endParaRPr lang="tr-TR" dirty="0" smtClean="0"/>
+              <a:t> domain</a:t>
+            </a:r>
           </a:p>
           <a:p>
             <a:endParaRPr lang="tr-TR" dirty="0" smtClean="0"/>
@@ -10155,7 +10018,7 @@
           <a:p>
             <a:fld id="{6827CE42-24F3-4CA7-A515-413F09EE414E}" type="datetimeFigureOut">
               <a:rPr lang="tr-TR" smtClean="0"/>
-              <a:t>14.4.2015</a:t>
+              <a:t>17.4.2015</a:t>
             </a:fld>
             <a:endParaRPr lang="tr-TR" dirty="0"/>
           </a:p>
@@ -10325,7 +10188,7 @@
           <a:p>
             <a:fld id="{6827CE42-24F3-4CA7-A515-413F09EE414E}" type="datetimeFigureOut">
               <a:rPr lang="tr-TR" smtClean="0"/>
-              <a:t>14.4.2015</a:t>
+              <a:t>17.4.2015</a:t>
             </a:fld>
             <a:endParaRPr lang="tr-TR" dirty="0"/>
           </a:p>
@@ -10505,7 +10368,7 @@
           <a:p>
             <a:fld id="{6827CE42-24F3-4CA7-A515-413F09EE414E}" type="datetimeFigureOut">
               <a:rPr lang="tr-TR" smtClean="0"/>
-              <a:t>14.4.2015</a:t>
+              <a:t>17.4.2015</a:t>
             </a:fld>
             <a:endParaRPr lang="tr-TR" dirty="0"/>
           </a:p>
@@ -10675,7 +10538,7 @@
           <a:p>
             <a:fld id="{6827CE42-24F3-4CA7-A515-413F09EE414E}" type="datetimeFigureOut">
               <a:rPr lang="tr-TR" smtClean="0"/>
-              <a:t>14.4.2015</a:t>
+              <a:t>17.4.2015</a:t>
             </a:fld>
             <a:endParaRPr lang="tr-TR" dirty="0"/>
           </a:p>
@@ -10921,7 +10784,7 @@
           <a:p>
             <a:fld id="{6827CE42-24F3-4CA7-A515-413F09EE414E}" type="datetimeFigureOut">
               <a:rPr lang="tr-TR" smtClean="0"/>
-              <a:t>14.4.2015</a:t>
+              <a:t>17.4.2015</a:t>
             </a:fld>
             <a:endParaRPr lang="tr-TR" dirty="0"/>
           </a:p>
@@ -11209,7 +11072,7 @@
           <a:p>
             <a:fld id="{6827CE42-24F3-4CA7-A515-413F09EE414E}" type="datetimeFigureOut">
               <a:rPr lang="tr-TR" smtClean="0"/>
-              <a:t>14.4.2015</a:t>
+              <a:t>17.4.2015</a:t>
             </a:fld>
             <a:endParaRPr lang="tr-TR" dirty="0"/>
           </a:p>
@@ -11631,7 +11494,7 @@
           <a:p>
             <a:fld id="{6827CE42-24F3-4CA7-A515-413F09EE414E}" type="datetimeFigureOut">
               <a:rPr lang="tr-TR" smtClean="0"/>
-              <a:t>14.4.2015</a:t>
+              <a:t>17.4.2015</a:t>
             </a:fld>
             <a:endParaRPr lang="tr-TR" dirty="0"/>
           </a:p>
@@ -11749,7 +11612,7 @@
           <a:p>
             <a:fld id="{6827CE42-24F3-4CA7-A515-413F09EE414E}" type="datetimeFigureOut">
               <a:rPr lang="tr-TR" smtClean="0"/>
-              <a:t>14.4.2015</a:t>
+              <a:t>17.4.2015</a:t>
             </a:fld>
             <a:endParaRPr lang="tr-TR" dirty="0"/>
           </a:p>
@@ -11844,7 +11707,7 @@
           <a:p>
             <a:fld id="{6827CE42-24F3-4CA7-A515-413F09EE414E}" type="datetimeFigureOut">
               <a:rPr lang="tr-TR" smtClean="0"/>
-              <a:t>14.4.2015</a:t>
+              <a:t>17.4.2015</a:t>
             </a:fld>
             <a:endParaRPr lang="tr-TR" dirty="0"/>
           </a:p>
@@ -12121,7 +11984,7 @@
           <a:p>
             <a:fld id="{6827CE42-24F3-4CA7-A515-413F09EE414E}" type="datetimeFigureOut">
               <a:rPr lang="tr-TR" smtClean="0"/>
-              <a:t>14.4.2015</a:t>
+              <a:t>17.4.2015</a:t>
             </a:fld>
             <a:endParaRPr lang="tr-TR" dirty="0"/>
           </a:p>
@@ -12374,7 +12237,7 @@
           <a:p>
             <a:fld id="{6827CE42-24F3-4CA7-A515-413F09EE414E}" type="datetimeFigureOut">
               <a:rPr lang="tr-TR" smtClean="0"/>
-              <a:t>14.4.2015</a:t>
+              <a:t>17.4.2015</a:t>
             </a:fld>
             <a:endParaRPr lang="tr-TR" dirty="0"/>
           </a:p>
@@ -12587,7 +12450,7 @@
           <a:p>
             <a:fld id="{6827CE42-24F3-4CA7-A515-413F09EE414E}" type="datetimeFigureOut">
               <a:rPr lang="tr-TR" smtClean="0"/>
-              <a:t>14.4.2015</a:t>
+              <a:t>17.4.2015</a:t>
             </a:fld>
             <a:endParaRPr lang="tr-TR" dirty="0"/>
           </a:p>
@@ -14219,27 +14082,7 @@
                   </a:schemeClr>
                 </a:solidFill>
               </a:rPr>
-              <a:t>sonraki </a:t>
-            </a:r>
-            <a:r>
-              <a:rPr lang="tr-TR" sz="2400" dirty="0" smtClean="0">
-                <a:solidFill>
-                  <a:schemeClr val="accent6">
-                    <a:lumMod val="50000"/>
-                  </a:schemeClr>
-                </a:solidFill>
-              </a:rPr>
-              <a:t>parametreleri </a:t>
-            </a:r>
-            <a:r>
-              <a:rPr lang="tr-TR" sz="2400" dirty="0" smtClean="0">
-                <a:solidFill>
-                  <a:schemeClr val="accent6">
-                    <a:lumMod val="50000"/>
-                  </a:schemeClr>
-                </a:solidFill>
-              </a:rPr>
-              <a:t>birbirinden ayırır.</a:t>
+              <a:t>sonraki parametreleri birbirinden ayırır.</a:t>
             </a:r>
             <a:endParaRPr lang="tr-TR" sz="2400" dirty="0" smtClean="0">
               <a:solidFill>
@@ -21554,11 +21397,6 @@
               </a:rPr>
               <a:t>2</a:t>
             </a:r>
-            <a:endParaRPr lang="tr-TR" sz="4400" b="1" dirty="0">
-              <a:solidFill>
-                <a:srgbClr val="7030A0"/>
-              </a:solidFill>
-            </a:endParaRPr>
           </a:p>
         </p:txBody>
       </p:sp>
@@ -21676,6 +21514,882 @@
           <a:chExt cx="0" cy="0"/>
         </a:xfrm>
       </p:grpSpPr>
+      <p:pic>
+        <p:nvPicPr>
+          <p:cNvPr id="23" name="İçerik Yer Tutucusu 22"/>
+          <p:cNvPicPr>
+            <a:picLocks noGrp="1" noChangeAspect="1"/>
+          </p:cNvPicPr>
+          <p:nvPr>
+            <p:ph idx="1"/>
+          </p:nvPr>
+        </p:nvPicPr>
+        <p:blipFill>
+          <a:blip r:embed="rId2">
+            <a:extLst>
+              <a:ext uri="{28A0092B-C50C-407E-A947-70E740481C1C}">
+                <a14:useLocalDpi xmlns:a14="http://schemas.microsoft.com/office/drawing/2010/main" val="0"/>
+              </a:ext>
+            </a:extLst>
+          </a:blip>
+          <a:stretch>
+            <a:fillRect/>
+          </a:stretch>
+        </p:blipFill>
+        <p:spPr>
+          <a:xfrm>
+            <a:off x="5004048" y="3210808"/>
+            <a:ext cx="1072229" cy="1643351"/>
+          </a:xfrm>
+        </p:spPr>
+      </p:pic>
+      <p:sp>
+        <p:nvSpPr>
+          <p:cNvPr id="2" name="Başlık 1"/>
+          <p:cNvSpPr>
+            <a:spLocks noGrp="1"/>
+          </p:cNvSpPr>
+          <p:nvPr>
+            <p:ph type="title"/>
+          </p:nvPr>
+        </p:nvSpPr>
+        <p:spPr/>
+        <p:txBody>
+          <a:bodyPr/>
+          <a:lstStyle/>
+          <a:p>
+            <a:endParaRPr lang="tr-TR" dirty="0"/>
+          </a:p>
+        </p:txBody>
+      </p:sp>
+      <p:pic>
+        <p:nvPicPr>
+          <p:cNvPr id="9" name="İçerik Yer Tutucusu 5"/>
+          <p:cNvPicPr>
+            <a:picLocks noChangeAspect="1"/>
+          </p:cNvPicPr>
+          <p:nvPr/>
+        </p:nvPicPr>
+        <p:blipFill>
+          <a:blip r:embed="rId3" cstate="print">
+            <a:extLst>
+              <a:ext uri="{28A0092B-C50C-407E-A947-70E740481C1C}">
+                <a14:useLocalDpi xmlns:a14="http://schemas.microsoft.com/office/drawing/2010/main" val="0"/>
+              </a:ext>
+            </a:extLst>
+          </a:blip>
+          <a:stretch>
+            <a:fillRect/>
+          </a:stretch>
+        </p:blipFill>
+        <p:spPr>
+          <a:xfrm>
+            <a:off x="645800" y="2124154"/>
+            <a:ext cx="2801166" cy="1008112"/>
+          </a:xfrm>
+          <a:prstGeom prst="rect">
+            <a:avLst/>
+          </a:prstGeom>
+        </p:spPr>
+      </p:pic>
+      <p:sp>
+        <p:nvSpPr>
+          <p:cNvPr id="11" name="Yuvarlatılmış Dikdörtgen 10"/>
+          <p:cNvSpPr/>
+          <p:nvPr/>
+        </p:nvSpPr>
+        <p:spPr>
+          <a:xfrm>
+            <a:off x="2157968" y="2761766"/>
+            <a:ext cx="864096" cy="216024"/>
+          </a:xfrm>
+          <a:prstGeom prst="roundRect">
+            <a:avLst/>
+          </a:prstGeom>
+          <a:noFill/>
+        </p:spPr>
+        <p:style>
+          <a:lnRef idx="2">
+            <a:schemeClr val="accent1">
+              <a:shade val="50000"/>
+            </a:schemeClr>
+          </a:lnRef>
+          <a:fillRef idx="1">
+            <a:schemeClr val="accent1"/>
+          </a:fillRef>
+          <a:effectRef idx="0">
+            <a:schemeClr val="accent1"/>
+          </a:effectRef>
+          <a:fontRef idx="minor">
+            <a:schemeClr val="lt1"/>
+          </a:fontRef>
+        </p:style>
+        <p:txBody>
+          <a:bodyPr rtlCol="0" anchor="ctr"/>
+          <a:lstStyle/>
+          <a:p>
+            <a:pPr algn="ctr"/>
+            <a:endParaRPr lang="tr-TR"/>
+          </a:p>
+        </p:txBody>
+      </p:sp>
+      <p:sp>
+        <p:nvSpPr>
+          <p:cNvPr id="14" name="Metin kutusu 13"/>
+          <p:cNvSpPr txBox="1"/>
+          <p:nvPr/>
+        </p:nvSpPr>
+        <p:spPr>
+          <a:xfrm>
+            <a:off x="348754" y="3492981"/>
+            <a:ext cx="2842552" cy="261610"/>
+          </a:xfrm>
+          <a:prstGeom prst="rect">
+            <a:avLst/>
+          </a:prstGeom>
+          <a:noFill/>
+          <a:ln>
+            <a:solidFill>
+              <a:srgbClr val="7030A0"/>
+            </a:solidFill>
+            <a:prstDash val="dash"/>
+          </a:ln>
+        </p:spPr>
+        <p:txBody>
+          <a:bodyPr wrap="square" rtlCol="0">
+            <a:spAutoFit/>
+          </a:bodyPr>
+          <a:lstStyle/>
+          <a:p>
+            <a:pPr algn="ctr"/>
+            <a:r>
+              <a:rPr lang="tr-TR" sz="1100" dirty="0"/>
+              <a:t>GET</a:t>
+            </a:r>
+            <a:r>
+              <a:rPr lang="tr-TR" sz="1100" dirty="0">
+                <a:solidFill>
+                  <a:srgbClr val="0070C0"/>
+                </a:solidFill>
+              </a:rPr>
+              <a:t> </a:t>
+            </a:r>
+            <a:r>
+              <a:rPr lang="tr-TR" sz="1100" b="1" dirty="0">
+                <a:solidFill>
+                  <a:srgbClr val="7030A0"/>
+                </a:solidFill>
+              </a:rPr>
+              <a:t>http</a:t>
+            </a:r>
+            <a:r>
+              <a:rPr lang="tr-TR" sz="1100" b="1" dirty="0"/>
+              <a:t>://</a:t>
+            </a:r>
+            <a:r>
+              <a:rPr lang="tr-TR" sz="1100" b="1" dirty="0">
+                <a:solidFill>
+                  <a:schemeClr val="accent2">
+                    <a:lumMod val="75000"/>
+                  </a:schemeClr>
+                </a:solidFill>
+              </a:rPr>
+              <a:t>www</a:t>
+            </a:r>
+            <a:r>
+              <a:rPr lang="tr-TR" sz="1100" b="1" dirty="0"/>
+              <a:t>.</a:t>
+            </a:r>
+            <a:r>
+              <a:rPr lang="tr-TR" sz="1100" b="1" dirty="0">
+                <a:solidFill>
+                  <a:schemeClr val="tx2">
+                    <a:lumMod val="60000"/>
+                    <a:lumOff val="40000"/>
+                  </a:schemeClr>
+                </a:solidFill>
+              </a:rPr>
+              <a:t>gazete.com</a:t>
+            </a:r>
+            <a:r>
+              <a:rPr lang="tr-TR" sz="1100" b="1" dirty="0"/>
+              <a:t>/</a:t>
+            </a:r>
+            <a:r>
+              <a:rPr lang="tr-TR" sz="1100" dirty="0">
+                <a:solidFill>
+                  <a:schemeClr val="accent3">
+                    <a:lumMod val="75000"/>
+                  </a:schemeClr>
+                </a:solidFill>
+              </a:rPr>
+              <a:t>s</a:t>
+            </a:r>
+            <a:r>
+              <a:rPr lang="en-US" sz="1100" dirty="0" err="1">
+                <a:solidFill>
+                  <a:schemeClr val="accent3">
+                    <a:lumMod val="75000"/>
+                  </a:schemeClr>
+                </a:solidFill>
+              </a:rPr>
+              <a:t>tatic</a:t>
+            </a:r>
+            <a:r>
+              <a:rPr lang="tr-TR" sz="1100" dirty="0">
+                <a:solidFill>
+                  <a:schemeClr val="accent3">
+                    <a:lumMod val="75000"/>
+                  </a:schemeClr>
+                </a:solidFill>
+              </a:rPr>
+              <a:t>/</a:t>
+            </a:r>
+            <a:r>
+              <a:rPr lang="tr-TR" sz="1100" dirty="0" err="1">
+                <a:solidFill>
+                  <a:schemeClr val="accent3">
+                    <a:lumMod val="75000"/>
+                  </a:schemeClr>
+                </a:solidFill>
+              </a:rPr>
+              <a:t>bye</a:t>
+            </a:r>
+            <a:r>
+              <a:rPr lang="en-US" sz="1100" dirty="0">
+                <a:solidFill>
+                  <a:schemeClr val="accent3">
+                    <a:lumMod val="75000"/>
+                  </a:schemeClr>
+                </a:solidFill>
+              </a:rPr>
+              <a:t>.</a:t>
+            </a:r>
+            <a:r>
+              <a:rPr lang="tr-TR" sz="1100" dirty="0">
+                <a:solidFill>
+                  <a:schemeClr val="accent3">
+                    <a:lumMod val="75000"/>
+                  </a:schemeClr>
+                </a:solidFill>
+              </a:rPr>
+              <a:t>html</a:t>
+            </a:r>
+            <a:endParaRPr lang="tr-TR" sz="1100" dirty="0">
+              <a:solidFill>
+                <a:srgbClr val="0070C0"/>
+              </a:solidFill>
+            </a:endParaRPr>
+          </a:p>
+        </p:txBody>
+      </p:sp>
+      <p:cxnSp>
+        <p:nvCxnSpPr>
+          <p:cNvPr id="16" name="Düz Ok Bağlayıcısı 15"/>
+          <p:cNvCxnSpPr>
+            <a:stCxn id="11" idx="2"/>
+          </p:cNvCxnSpPr>
+          <p:nvPr/>
+        </p:nvCxnSpPr>
+        <p:spPr>
+          <a:xfrm>
+            <a:off x="2590016" y="2977790"/>
+            <a:ext cx="0" cy="491552"/>
+          </a:xfrm>
+          <a:prstGeom prst="straightConnector1">
+            <a:avLst/>
+          </a:prstGeom>
+          <a:ln w="19050">
+            <a:solidFill>
+              <a:schemeClr val="accent1">
+                <a:lumMod val="75000"/>
+              </a:schemeClr>
+            </a:solidFill>
+            <a:tailEnd type="arrow"/>
+          </a:ln>
+        </p:spPr>
+        <p:style>
+          <a:lnRef idx="1">
+            <a:schemeClr val="accent1"/>
+          </a:lnRef>
+          <a:fillRef idx="0">
+            <a:schemeClr val="accent1"/>
+          </a:fillRef>
+          <a:effectRef idx="0">
+            <a:schemeClr val="accent1"/>
+          </a:effectRef>
+          <a:fontRef idx="minor">
+            <a:schemeClr val="tx1"/>
+          </a:fontRef>
+        </p:style>
+      </p:cxnSp>
+      <p:cxnSp>
+        <p:nvCxnSpPr>
+          <p:cNvPr id="17" name="Düz Ok Bağlayıcısı 16"/>
+          <p:cNvCxnSpPr/>
+          <p:nvPr/>
+        </p:nvCxnSpPr>
+        <p:spPr>
+          <a:xfrm>
+            <a:off x="3223750" y="3623786"/>
+            <a:ext cx="1790684" cy="0"/>
+          </a:xfrm>
+          <a:prstGeom prst="straightConnector1">
+            <a:avLst/>
+          </a:prstGeom>
+          <a:ln w="19050">
+            <a:solidFill>
+              <a:srgbClr val="7030A0"/>
+            </a:solidFill>
+            <a:tailEnd type="arrow"/>
+          </a:ln>
+        </p:spPr>
+        <p:style>
+          <a:lnRef idx="1">
+            <a:schemeClr val="accent1"/>
+          </a:lnRef>
+          <a:fillRef idx="0">
+            <a:schemeClr val="accent1"/>
+          </a:fillRef>
+          <a:effectRef idx="0">
+            <a:schemeClr val="accent1"/>
+          </a:effectRef>
+          <a:fontRef idx="minor">
+            <a:schemeClr val="tx1"/>
+          </a:fontRef>
+        </p:style>
+      </p:cxnSp>
+      <p:cxnSp>
+        <p:nvCxnSpPr>
+          <p:cNvPr id="20" name="Düz Bağlayıcı 19"/>
+          <p:cNvCxnSpPr/>
+          <p:nvPr/>
+        </p:nvCxnSpPr>
+        <p:spPr>
+          <a:xfrm>
+            <a:off x="4008298" y="2149132"/>
+            <a:ext cx="72008" cy="3753118"/>
+          </a:xfrm>
+          <a:prstGeom prst="line">
+            <a:avLst/>
+          </a:prstGeom>
+          <a:ln w="28575">
+            <a:solidFill>
+              <a:srgbClr val="7030A0"/>
+            </a:solidFill>
+            <a:prstDash val="dash"/>
+          </a:ln>
+        </p:spPr>
+        <p:style>
+          <a:lnRef idx="1">
+            <a:schemeClr val="accent1"/>
+          </a:lnRef>
+          <a:fillRef idx="0">
+            <a:schemeClr val="accent1"/>
+          </a:fillRef>
+          <a:effectRef idx="0">
+            <a:schemeClr val="accent1"/>
+          </a:effectRef>
+          <a:fontRef idx="minor">
+            <a:schemeClr val="tx1"/>
+          </a:fontRef>
+        </p:style>
+      </p:cxnSp>
+      <p:sp>
+        <p:nvSpPr>
+          <p:cNvPr id="22" name="Metin kutusu 21"/>
+          <p:cNvSpPr txBox="1"/>
+          <p:nvPr/>
+        </p:nvSpPr>
+        <p:spPr>
+          <a:xfrm>
+            <a:off x="3609004" y="1677305"/>
+            <a:ext cx="843912" cy="461665"/>
+          </a:xfrm>
+          <a:prstGeom prst="rect">
+            <a:avLst/>
+          </a:prstGeom>
+          <a:noFill/>
+        </p:spPr>
+        <p:txBody>
+          <a:bodyPr wrap="square" rtlCol="0">
+            <a:spAutoFit/>
+          </a:bodyPr>
+          <a:lstStyle/>
+          <a:p>
+            <a:pPr algn="ctr"/>
+            <a:r>
+              <a:rPr lang="tr-TR" sz="2400" b="1" dirty="0" smtClean="0">
+                <a:solidFill>
+                  <a:srgbClr val="7030A0"/>
+                </a:solidFill>
+              </a:rPr>
+              <a:t>http</a:t>
+            </a:r>
+            <a:endParaRPr lang="tr-TR" sz="2400" b="1" dirty="0">
+              <a:solidFill>
+                <a:srgbClr val="7030A0"/>
+              </a:solidFill>
+            </a:endParaRPr>
+          </a:p>
+        </p:txBody>
+      </p:sp>
+      <p:sp>
+        <p:nvSpPr>
+          <p:cNvPr id="24" name="Metin kutusu 23"/>
+          <p:cNvSpPr txBox="1"/>
+          <p:nvPr/>
+        </p:nvSpPr>
+        <p:spPr>
+          <a:xfrm>
+            <a:off x="4823088" y="2728271"/>
+            <a:ext cx="1491228" cy="461665"/>
+          </a:xfrm>
+          <a:prstGeom prst="rect">
+            <a:avLst/>
+          </a:prstGeom>
+          <a:noFill/>
+        </p:spPr>
+        <p:txBody>
+          <a:bodyPr wrap="square" rtlCol="0">
+            <a:spAutoFit/>
+          </a:bodyPr>
+          <a:lstStyle/>
+          <a:p>
+            <a:pPr algn="ctr"/>
+            <a:r>
+              <a:rPr lang="tr-TR" sz="2400" b="1" dirty="0" smtClean="0">
+                <a:solidFill>
+                  <a:schemeClr val="accent2">
+                    <a:lumMod val="75000"/>
+                  </a:schemeClr>
+                </a:solidFill>
+              </a:rPr>
+              <a:t>www</a:t>
+            </a:r>
+            <a:endParaRPr lang="tr-TR" sz="2400" b="1" dirty="0">
+              <a:solidFill>
+                <a:schemeClr val="accent2">
+                  <a:lumMod val="75000"/>
+                </a:schemeClr>
+              </a:solidFill>
+            </a:endParaRPr>
+          </a:p>
+        </p:txBody>
+      </p:sp>
+      <p:pic>
+        <p:nvPicPr>
+          <p:cNvPr id="29" name="Resim 28"/>
+          <p:cNvPicPr>
+            <a:picLocks noChangeAspect="1"/>
+          </p:cNvPicPr>
+          <p:nvPr/>
+        </p:nvPicPr>
+        <p:blipFill>
+          <a:blip r:embed="rId4" cstate="print">
+            <a:extLst>
+              <a:ext uri="{28A0092B-C50C-407E-A947-70E740481C1C}">
+                <a14:useLocalDpi xmlns:a14="http://schemas.microsoft.com/office/drawing/2010/main" val="0"/>
+              </a:ext>
+            </a:extLst>
+          </a:blip>
+          <a:stretch>
+            <a:fillRect/>
+          </a:stretch>
+        </p:blipFill>
+        <p:spPr>
+          <a:xfrm>
+            <a:off x="6357084" y="3623786"/>
+            <a:ext cx="2223247" cy="936104"/>
+          </a:xfrm>
+          <a:prstGeom prst="rect">
+            <a:avLst/>
+          </a:prstGeom>
+        </p:spPr>
+      </p:pic>
+      <p:sp>
+        <p:nvSpPr>
+          <p:cNvPr id="30" name="Yuvarlatılmış Dikdörtgen 29"/>
+          <p:cNvSpPr/>
+          <p:nvPr/>
+        </p:nvSpPr>
+        <p:spPr>
+          <a:xfrm>
+            <a:off x="6307544" y="3515774"/>
+            <a:ext cx="2301719" cy="1152128"/>
+          </a:xfrm>
+          <a:prstGeom prst="roundRect">
+            <a:avLst/>
+          </a:prstGeom>
+          <a:noFill/>
+          <a:ln>
+            <a:solidFill>
+              <a:schemeClr val="accent3">
+                <a:lumMod val="75000"/>
+              </a:schemeClr>
+            </a:solidFill>
+          </a:ln>
+        </p:spPr>
+        <p:style>
+          <a:lnRef idx="2">
+            <a:schemeClr val="accent1">
+              <a:shade val="50000"/>
+            </a:schemeClr>
+          </a:lnRef>
+          <a:fillRef idx="1">
+            <a:schemeClr val="accent1"/>
+          </a:fillRef>
+          <a:effectRef idx="0">
+            <a:schemeClr val="accent1"/>
+          </a:effectRef>
+          <a:fontRef idx="minor">
+            <a:schemeClr val="lt1"/>
+          </a:fontRef>
+        </p:style>
+        <p:txBody>
+          <a:bodyPr rtlCol="0" anchor="ctr"/>
+          <a:lstStyle/>
+          <a:p>
+            <a:pPr algn="ctr"/>
+            <a:endParaRPr lang="tr-TR"/>
+          </a:p>
+        </p:txBody>
+      </p:sp>
+      <p:sp>
+        <p:nvSpPr>
+          <p:cNvPr id="31" name="Metin kutusu 30"/>
+          <p:cNvSpPr txBox="1"/>
+          <p:nvPr/>
+        </p:nvSpPr>
+        <p:spPr>
+          <a:xfrm>
+            <a:off x="6212294" y="3189936"/>
+            <a:ext cx="1720840" cy="369332"/>
+          </a:xfrm>
+          <a:prstGeom prst="rect">
+            <a:avLst/>
+          </a:prstGeom>
+          <a:noFill/>
+        </p:spPr>
+        <p:txBody>
+          <a:bodyPr wrap="square" rtlCol="0">
+            <a:spAutoFit/>
+          </a:bodyPr>
+          <a:lstStyle/>
+          <a:p>
+            <a:r>
+              <a:rPr lang="tr-TR" dirty="0" smtClean="0">
+                <a:solidFill>
+                  <a:schemeClr val="accent3">
+                    <a:lumMod val="75000"/>
+                  </a:schemeClr>
+                </a:solidFill>
+              </a:rPr>
+              <a:t>/</a:t>
+            </a:r>
+            <a:r>
+              <a:rPr lang="tr-TR" dirty="0" err="1" smtClean="0">
+                <a:solidFill>
+                  <a:schemeClr val="accent3">
+                    <a:lumMod val="75000"/>
+                  </a:schemeClr>
+                </a:solidFill>
+              </a:rPr>
+              <a:t>static</a:t>
+            </a:r>
+            <a:r>
+              <a:rPr lang="tr-TR" dirty="0" smtClean="0">
+                <a:solidFill>
+                  <a:schemeClr val="accent3">
+                    <a:lumMod val="75000"/>
+                  </a:schemeClr>
+                </a:solidFill>
+              </a:rPr>
+              <a:t>/bye.html</a:t>
+            </a:r>
+            <a:endParaRPr lang="tr-TR" dirty="0">
+              <a:solidFill>
+                <a:schemeClr val="accent3">
+                  <a:lumMod val="75000"/>
+                </a:schemeClr>
+              </a:solidFill>
+            </a:endParaRPr>
+          </a:p>
+        </p:txBody>
+      </p:sp>
+      <p:pic>
+        <p:nvPicPr>
+          <p:cNvPr id="36" name="Resim 35"/>
+          <p:cNvPicPr>
+            <a:picLocks noChangeAspect="1"/>
+          </p:cNvPicPr>
+          <p:nvPr/>
+        </p:nvPicPr>
+        <p:blipFill>
+          <a:blip r:embed="rId4" cstate="print">
+            <a:extLst>
+              <a:ext uri="{28A0092B-C50C-407E-A947-70E740481C1C}">
+                <a14:useLocalDpi xmlns:a14="http://schemas.microsoft.com/office/drawing/2010/main" val="0"/>
+              </a:ext>
+            </a:extLst>
+          </a:blip>
+          <a:stretch>
+            <a:fillRect/>
+          </a:stretch>
+        </p:blipFill>
+        <p:spPr>
+          <a:xfrm>
+            <a:off x="608443" y="4307862"/>
+            <a:ext cx="2223247" cy="936104"/>
+          </a:xfrm>
+          <a:prstGeom prst="rect">
+            <a:avLst/>
+          </a:prstGeom>
+        </p:spPr>
+      </p:pic>
+      <p:sp>
+        <p:nvSpPr>
+          <p:cNvPr id="37" name="Yuvarlatılmış Dikdörtgen 36"/>
+          <p:cNvSpPr/>
+          <p:nvPr/>
+        </p:nvSpPr>
+        <p:spPr>
+          <a:xfrm>
+            <a:off x="558903" y="4199850"/>
+            <a:ext cx="2572937" cy="1152128"/>
+          </a:xfrm>
+          <a:prstGeom prst="roundRect">
+            <a:avLst/>
+          </a:prstGeom>
+          <a:noFill/>
+          <a:ln>
+            <a:solidFill>
+              <a:srgbClr val="0070C0"/>
+            </a:solidFill>
+            <a:prstDash val="sysDot"/>
+          </a:ln>
+        </p:spPr>
+        <p:style>
+          <a:lnRef idx="2">
+            <a:schemeClr val="accent1">
+              <a:shade val="50000"/>
+            </a:schemeClr>
+          </a:lnRef>
+          <a:fillRef idx="1">
+            <a:schemeClr val="accent1"/>
+          </a:fillRef>
+          <a:effectRef idx="0">
+            <a:schemeClr val="accent1"/>
+          </a:effectRef>
+          <a:fontRef idx="minor">
+            <a:schemeClr val="lt1"/>
+          </a:fontRef>
+        </p:style>
+        <p:txBody>
+          <a:bodyPr rtlCol="0" anchor="ctr"/>
+          <a:lstStyle/>
+          <a:p>
+            <a:pPr algn="ctr"/>
+            <a:endParaRPr lang="tr-TR"/>
+          </a:p>
+        </p:txBody>
+      </p:sp>
+      <p:sp>
+        <p:nvSpPr>
+          <p:cNvPr id="47" name="Metin kutusu 46"/>
+          <p:cNvSpPr txBox="1"/>
+          <p:nvPr/>
+        </p:nvSpPr>
+        <p:spPr>
+          <a:xfrm>
+            <a:off x="3223750" y="3346784"/>
+            <a:ext cx="792088" cy="276999"/>
+          </a:xfrm>
+          <a:prstGeom prst="rect">
+            <a:avLst/>
+          </a:prstGeom>
+          <a:noFill/>
+        </p:spPr>
+        <p:txBody>
+          <a:bodyPr wrap="square" rtlCol="0">
+            <a:spAutoFit/>
+          </a:bodyPr>
+          <a:lstStyle/>
+          <a:p>
+            <a:pPr algn="ctr"/>
+            <a:r>
+              <a:rPr lang="tr-TR" sz="1200" b="1" dirty="0" err="1" smtClean="0">
+                <a:solidFill>
+                  <a:srgbClr val="7030A0"/>
+                </a:solidFill>
+              </a:rPr>
+              <a:t>request</a:t>
+            </a:r>
+            <a:endParaRPr lang="tr-TR" sz="1200" b="1" dirty="0">
+              <a:solidFill>
+                <a:srgbClr val="7030A0"/>
+              </a:solidFill>
+            </a:endParaRPr>
+          </a:p>
+        </p:txBody>
+      </p:sp>
+      <p:sp>
+        <p:nvSpPr>
+          <p:cNvPr id="49" name="Metin kutusu 48"/>
+          <p:cNvSpPr txBox="1"/>
+          <p:nvPr/>
+        </p:nvSpPr>
+        <p:spPr>
+          <a:xfrm>
+            <a:off x="4082992" y="3953338"/>
+            <a:ext cx="892245" cy="276999"/>
+          </a:xfrm>
+          <a:prstGeom prst="rect">
+            <a:avLst/>
+          </a:prstGeom>
+          <a:noFill/>
+        </p:spPr>
+        <p:txBody>
+          <a:bodyPr wrap="square" rtlCol="0">
+            <a:spAutoFit/>
+          </a:bodyPr>
+          <a:lstStyle/>
+          <a:p>
+            <a:pPr algn="ctr"/>
+            <a:r>
+              <a:rPr lang="tr-TR" sz="1200" b="1" dirty="0" err="1" smtClean="0">
+                <a:solidFill>
+                  <a:srgbClr val="7030A0"/>
+                </a:solidFill>
+              </a:rPr>
+              <a:t>response</a:t>
+            </a:r>
+            <a:endParaRPr lang="tr-TR" sz="1200" b="1" dirty="0">
+              <a:solidFill>
+                <a:srgbClr val="7030A0"/>
+              </a:solidFill>
+            </a:endParaRPr>
+          </a:p>
+        </p:txBody>
+      </p:sp>
+      <p:sp>
+        <p:nvSpPr>
+          <p:cNvPr id="53" name="Metin kutusu 52"/>
+          <p:cNvSpPr txBox="1"/>
+          <p:nvPr/>
+        </p:nvSpPr>
+        <p:spPr>
+          <a:xfrm>
+            <a:off x="5903106" y="1628800"/>
+            <a:ext cx="1264064" cy="369332"/>
+          </a:xfrm>
+          <a:prstGeom prst="rect">
+            <a:avLst/>
+          </a:prstGeom>
+          <a:noFill/>
+          <a:ln w="19050">
+            <a:solidFill>
+              <a:schemeClr val="tx2">
+                <a:lumMod val="60000"/>
+                <a:lumOff val="40000"/>
+              </a:schemeClr>
+            </a:solidFill>
+          </a:ln>
+        </p:spPr>
+        <p:txBody>
+          <a:bodyPr wrap="none" rtlCol="0">
+            <a:spAutoFit/>
+          </a:bodyPr>
+          <a:lstStyle/>
+          <a:p>
+            <a:r>
+              <a:rPr lang="tr-TR" b="1" dirty="0">
+                <a:solidFill>
+                  <a:schemeClr val="tx2">
+                    <a:lumMod val="60000"/>
+                    <a:lumOff val="40000"/>
+                  </a:schemeClr>
+                </a:solidFill>
+              </a:rPr>
+              <a:t>gazete.com</a:t>
+            </a:r>
+            <a:endParaRPr lang="tr-TR" dirty="0"/>
+          </a:p>
+        </p:txBody>
+      </p:sp>
+      <p:cxnSp>
+        <p:nvCxnSpPr>
+          <p:cNvPr id="68" name="Düz Ok Bağlayıcısı 67"/>
+          <p:cNvCxnSpPr/>
+          <p:nvPr/>
+        </p:nvCxnSpPr>
+        <p:spPr>
+          <a:xfrm flipH="1">
+            <a:off x="3172792" y="4226488"/>
+            <a:ext cx="1787587" cy="0"/>
+          </a:xfrm>
+          <a:prstGeom prst="straightConnector1">
+            <a:avLst/>
+          </a:prstGeom>
+          <a:ln w="19050">
+            <a:solidFill>
+              <a:srgbClr val="7030A0"/>
+            </a:solidFill>
+            <a:tailEnd type="arrow"/>
+          </a:ln>
+        </p:spPr>
+        <p:style>
+          <a:lnRef idx="1">
+            <a:schemeClr val="accent1"/>
+          </a:lnRef>
+          <a:fillRef idx="0">
+            <a:schemeClr val="accent1"/>
+          </a:fillRef>
+          <a:effectRef idx="0">
+            <a:schemeClr val="accent1"/>
+          </a:effectRef>
+          <a:fontRef idx="minor">
+            <a:schemeClr val="tx1"/>
+          </a:fontRef>
+        </p:style>
+      </p:cxnSp>
+    </p:spTree>
+    <p:extLst>
+      <p:ext uri="{BB962C8B-B14F-4D97-AF65-F5344CB8AC3E}">
+        <p14:creationId xmlns:p14="http://schemas.microsoft.com/office/powerpoint/2010/main" val="938899987"/>
+      </p:ext>
+    </p:extLst>
+  </p:cSld>
+  <p:clrMapOvr>
+    <a:masterClrMapping/>
+  </p:clrMapOvr>
+  <p:timing>
+    <p:tnLst>
+      <p:par>
+        <p:cTn id="1" dur="indefinite" restart="never" nodeType="tmRoot"/>
+      </p:par>
+    </p:tnLst>
+  </p:timing>
+</p:sld>
+</file>
+
+<file path=ppt/slides/slide29.xml><?xml version="1.0" encoding="utf-8"?>
+<p:sld xmlns:a="http://schemas.openxmlformats.org/drawingml/2006/main" xmlns:r="http://schemas.openxmlformats.org/officeDocument/2006/relationships" xmlns:p="http://schemas.openxmlformats.org/presentationml/2006/main">
+  <p:cSld>
+    <p:spTree>
+      <p:nvGrpSpPr>
+        <p:cNvPr id="1" name=""/>
+        <p:cNvGrpSpPr/>
+        <p:nvPr/>
+      </p:nvGrpSpPr>
+      <p:grpSpPr>
+        <a:xfrm>
+          <a:off x="0" y="0"/>
+          <a:ext cx="0" cy="0"/>
+          <a:chOff x="0" y="0"/>
+          <a:chExt cx="0" cy="0"/>
+        </a:xfrm>
+      </p:grpSpPr>
       <p:sp>
         <p:nvSpPr>
           <p:cNvPr id="3" name="İçerik Yer Tutucusu 2"/>
@@ -22063,395 +22777,6 @@
   <p:clrMapOvr>
     <a:masterClrMapping/>
   </p:clrMapOvr>
-</p:sld>
-</file>
-
-<file path=ppt/slides/slide29.xml><?xml version="1.0" encoding="utf-8"?>
-<p:sld xmlns:a="http://schemas.openxmlformats.org/drawingml/2006/main" xmlns:r="http://schemas.openxmlformats.org/officeDocument/2006/relationships" xmlns:p="http://schemas.openxmlformats.org/presentationml/2006/main">
-  <p:cSld>
-    <p:spTree>
-      <p:nvGrpSpPr>
-        <p:cNvPr id="1" name=""/>
-        <p:cNvGrpSpPr/>
-        <p:nvPr/>
-      </p:nvGrpSpPr>
-      <p:grpSpPr>
-        <a:xfrm>
-          <a:off x="0" y="0"/>
-          <a:ext cx="0" cy="0"/>
-          <a:chOff x="0" y="0"/>
-          <a:chExt cx="0" cy="0"/>
-        </a:xfrm>
-      </p:grpSpPr>
-      <p:sp>
-        <p:nvSpPr>
-          <p:cNvPr id="5" name="İçerik Yer Tutucusu 2"/>
-          <p:cNvSpPr txBox="1">
-            <a:spLocks/>
-          </p:cNvSpPr>
-          <p:nvPr/>
-        </p:nvSpPr>
-        <p:spPr>
-          <a:xfrm>
-            <a:off x="179512" y="1700809"/>
-            <a:ext cx="8867328" cy="4953018"/>
-          </a:xfrm>
-          <a:prstGeom prst="rect">
-            <a:avLst/>
-          </a:prstGeom>
-        </p:spPr>
-        <p:txBody>
-          <a:bodyPr vert="horz" lIns="91440" tIns="45720" rIns="91440" bIns="45720" rtlCol="0">
-            <a:normAutofit/>
-          </a:bodyPr>
-          <a:lstStyle>
-            <a:lvl1pPr marL="342900" indent="-342900" algn="l" defTabSz="914400" rtl="0" eaLnBrk="1" latinLnBrk="0" hangingPunct="1">
-              <a:spcBef>
-                <a:spcPct val="20000"/>
-              </a:spcBef>
-              <a:buFont typeface="Arial" pitchFamily="34" charset="0"/>
-              <a:buChar char="•"/>
-              <a:defRPr sz="3200" kern="1200">
-                <a:solidFill>
-                  <a:schemeClr val="tx1"/>
-                </a:solidFill>
-                <a:latin typeface="+mn-lt"/>
-                <a:ea typeface="+mn-ea"/>
-                <a:cs typeface="+mn-cs"/>
-              </a:defRPr>
-            </a:lvl1pPr>
-            <a:lvl2pPr marL="742950" indent="-285750" algn="l" defTabSz="914400" rtl="0" eaLnBrk="1" latinLnBrk="0" hangingPunct="1">
-              <a:spcBef>
-                <a:spcPct val="20000"/>
-              </a:spcBef>
-              <a:buFont typeface="Arial" pitchFamily="34" charset="0"/>
-              <a:buChar char="–"/>
-              <a:defRPr sz="2800" kern="1200">
-                <a:solidFill>
-                  <a:schemeClr val="tx1"/>
-                </a:solidFill>
-                <a:latin typeface="+mn-lt"/>
-                <a:ea typeface="+mn-ea"/>
-                <a:cs typeface="+mn-cs"/>
-              </a:defRPr>
-            </a:lvl2pPr>
-            <a:lvl3pPr marL="1143000" indent="-228600" algn="l" defTabSz="914400" rtl="0" eaLnBrk="1" latinLnBrk="0" hangingPunct="1">
-              <a:spcBef>
-                <a:spcPct val="20000"/>
-              </a:spcBef>
-              <a:buFont typeface="Arial" pitchFamily="34" charset="0"/>
-              <a:buChar char="•"/>
-              <a:defRPr sz="2400" kern="1200">
-                <a:solidFill>
-                  <a:schemeClr val="tx1"/>
-                </a:solidFill>
-                <a:latin typeface="+mn-lt"/>
-                <a:ea typeface="+mn-ea"/>
-                <a:cs typeface="+mn-cs"/>
-              </a:defRPr>
-            </a:lvl3pPr>
-            <a:lvl4pPr marL="1600200" indent="-228600" algn="l" defTabSz="914400" rtl="0" eaLnBrk="1" latinLnBrk="0" hangingPunct="1">
-              <a:spcBef>
-                <a:spcPct val="20000"/>
-              </a:spcBef>
-              <a:buFont typeface="Arial" pitchFamily="34" charset="0"/>
-              <a:buChar char="–"/>
-              <a:defRPr sz="2000" kern="1200">
-                <a:solidFill>
-                  <a:schemeClr val="tx1"/>
-                </a:solidFill>
-                <a:latin typeface="+mn-lt"/>
-                <a:ea typeface="+mn-ea"/>
-                <a:cs typeface="+mn-cs"/>
-              </a:defRPr>
-            </a:lvl4pPr>
-            <a:lvl5pPr marL="2057400" indent="-228600" algn="l" defTabSz="914400" rtl="0" eaLnBrk="1" latinLnBrk="0" hangingPunct="1">
-              <a:spcBef>
-                <a:spcPct val="20000"/>
-              </a:spcBef>
-              <a:buFont typeface="Arial" pitchFamily="34" charset="0"/>
-              <a:buChar char="»"/>
-              <a:defRPr sz="2000" kern="1200">
-                <a:solidFill>
-                  <a:schemeClr val="tx1"/>
-                </a:solidFill>
-                <a:latin typeface="+mn-lt"/>
-                <a:ea typeface="+mn-ea"/>
-                <a:cs typeface="+mn-cs"/>
-              </a:defRPr>
-            </a:lvl5pPr>
-            <a:lvl6pPr marL="2514600" indent="-228600" algn="l" defTabSz="914400" rtl="0" eaLnBrk="1" latinLnBrk="0" hangingPunct="1">
-              <a:spcBef>
-                <a:spcPct val="20000"/>
-              </a:spcBef>
-              <a:buFont typeface="Arial" pitchFamily="34" charset="0"/>
-              <a:buChar char="•"/>
-              <a:defRPr sz="2000" kern="1200">
-                <a:solidFill>
-                  <a:schemeClr val="tx1"/>
-                </a:solidFill>
-                <a:latin typeface="+mn-lt"/>
-                <a:ea typeface="+mn-ea"/>
-                <a:cs typeface="+mn-cs"/>
-              </a:defRPr>
-            </a:lvl6pPr>
-            <a:lvl7pPr marL="2971800" indent="-228600" algn="l" defTabSz="914400" rtl="0" eaLnBrk="1" latinLnBrk="0" hangingPunct="1">
-              <a:spcBef>
-                <a:spcPct val="20000"/>
-              </a:spcBef>
-              <a:buFont typeface="Arial" pitchFamily="34" charset="0"/>
-              <a:buChar char="•"/>
-              <a:defRPr sz="2000" kern="1200">
-                <a:solidFill>
-                  <a:schemeClr val="tx1"/>
-                </a:solidFill>
-                <a:latin typeface="+mn-lt"/>
-                <a:ea typeface="+mn-ea"/>
-                <a:cs typeface="+mn-cs"/>
-              </a:defRPr>
-            </a:lvl7pPr>
-            <a:lvl8pPr marL="3429000" indent="-228600" algn="l" defTabSz="914400" rtl="0" eaLnBrk="1" latinLnBrk="0" hangingPunct="1">
-              <a:spcBef>
-                <a:spcPct val="20000"/>
-              </a:spcBef>
-              <a:buFont typeface="Arial" pitchFamily="34" charset="0"/>
-              <a:buChar char="•"/>
-              <a:defRPr sz="2000" kern="1200">
-                <a:solidFill>
-                  <a:schemeClr val="tx1"/>
-                </a:solidFill>
-                <a:latin typeface="+mn-lt"/>
-                <a:ea typeface="+mn-ea"/>
-                <a:cs typeface="+mn-cs"/>
-              </a:defRPr>
-            </a:lvl8pPr>
-            <a:lvl9pPr marL="3886200" indent="-228600" algn="l" defTabSz="914400" rtl="0" eaLnBrk="1" latinLnBrk="0" hangingPunct="1">
-              <a:spcBef>
-                <a:spcPct val="20000"/>
-              </a:spcBef>
-              <a:buFont typeface="Arial" pitchFamily="34" charset="0"/>
-              <a:buChar char="•"/>
-              <a:defRPr sz="2000" kern="1200">
-                <a:solidFill>
-                  <a:schemeClr val="tx1"/>
-                </a:solidFill>
-                <a:latin typeface="+mn-lt"/>
-                <a:ea typeface="+mn-ea"/>
-                <a:cs typeface="+mn-cs"/>
-              </a:defRPr>
-            </a:lvl9pPr>
-          </a:lstStyle>
-          <a:p>
-            <a:pPr marL="0" indent="0">
-              <a:buFont typeface="Arial" pitchFamily="34" charset="0"/>
-              <a:buNone/>
-            </a:pPr>
-            <a:endParaRPr lang="tr-TR" b="1" dirty="0" smtClean="0">
-              <a:solidFill>
-                <a:schemeClr val="accent3">
-                  <a:lumMod val="75000"/>
-                </a:schemeClr>
-              </a:solidFill>
-            </a:endParaRPr>
-          </a:p>
-        </p:txBody>
-      </p:sp>
-      <p:sp>
-        <p:nvSpPr>
-          <p:cNvPr id="10" name="Başlık 1"/>
-          <p:cNvSpPr>
-            <a:spLocks noGrp="1"/>
-          </p:cNvSpPr>
-          <p:nvPr>
-            <p:ph type="title"/>
-          </p:nvPr>
-        </p:nvSpPr>
-        <p:spPr>
-          <a:xfrm>
-            <a:off x="457200" y="274638"/>
-            <a:ext cx="8229600" cy="1143000"/>
-          </a:xfrm>
-        </p:spPr>
-        <p:txBody>
-          <a:bodyPr>
-            <a:normAutofit fontScale="90000"/>
-          </a:bodyPr>
-          <a:lstStyle/>
-          <a:p>
-            <a:r>
-              <a:rPr lang="tr-TR" b="1" dirty="0" smtClean="0"/>
-              <a:t>URL</a:t>
-            </a:r>
-            <a:br>
-              <a:rPr lang="tr-TR" b="1" dirty="0" smtClean="0"/>
-            </a:br>
-            <a:r>
-              <a:rPr lang="tr-TR" dirty="0" smtClean="0"/>
-              <a:t>geçerli karakter kümesi</a:t>
-            </a:r>
-            <a:r>
-              <a:rPr lang="tr-TR" b="1" dirty="0" smtClean="0"/>
-              <a:t> </a:t>
-            </a:r>
-            <a:endParaRPr lang="tr-TR" dirty="0"/>
-          </a:p>
-        </p:txBody>
-      </p:sp>
-      <p:sp>
-        <p:nvSpPr>
-          <p:cNvPr id="11" name="Başlık 1"/>
-          <p:cNvSpPr txBox="1">
-            <a:spLocks/>
-          </p:cNvSpPr>
-          <p:nvPr/>
-        </p:nvSpPr>
-        <p:spPr>
-          <a:xfrm>
-            <a:off x="292696" y="1806180"/>
-            <a:ext cx="8640960" cy="4742275"/>
-          </a:xfrm>
-          <a:prstGeom prst="rect">
-            <a:avLst/>
-          </a:prstGeom>
-        </p:spPr>
-        <p:txBody>
-          <a:bodyPr vert="horz" lIns="91440" tIns="45720" rIns="91440" bIns="45720" rtlCol="0" anchor="t">
-            <a:normAutofit fontScale="97500"/>
-          </a:bodyPr>
-          <a:lstStyle>
-            <a:lvl1pPr algn="ctr" defTabSz="914400" rtl="0" eaLnBrk="1" latinLnBrk="0" hangingPunct="1">
-              <a:spcBef>
-                <a:spcPct val="0"/>
-              </a:spcBef>
-              <a:buNone/>
-              <a:defRPr sz="4400" kern="1200">
-                <a:solidFill>
-                  <a:schemeClr val="tx1"/>
-                </a:solidFill>
-                <a:latin typeface="+mj-lt"/>
-                <a:ea typeface="+mj-ea"/>
-                <a:cs typeface="+mj-cs"/>
-              </a:defRPr>
-            </a:lvl1pPr>
-          </a:lstStyle>
-          <a:p>
-            <a:pPr marL="342900" indent="-342900" algn="l">
-              <a:buFont typeface="Arial" pitchFamily="34" charset="0"/>
-              <a:buChar char="•"/>
-            </a:pPr>
-            <a:r>
-              <a:rPr lang="tr-TR" sz="4100" dirty="0" smtClean="0">
-                <a:solidFill>
-                  <a:schemeClr val="accent3">
-                    <a:lumMod val="50000"/>
-                  </a:schemeClr>
-                </a:solidFill>
-              </a:rPr>
-              <a:t>ABCDEFGHIJKLMNOPQRSTUVWXYZ</a:t>
-            </a:r>
-          </a:p>
-          <a:p>
-            <a:pPr marL="342900" indent="-342900" algn="l">
-              <a:buFont typeface="Arial" pitchFamily="34" charset="0"/>
-              <a:buChar char="•"/>
-            </a:pPr>
-            <a:r>
-              <a:rPr lang="tr-TR" sz="4100" dirty="0" err="1">
-                <a:solidFill>
-                  <a:schemeClr val="accent3">
-                    <a:lumMod val="50000"/>
-                  </a:schemeClr>
-                </a:solidFill>
-              </a:rPr>
-              <a:t>a</a:t>
-            </a:r>
-            <a:r>
-              <a:rPr lang="tr-TR" sz="4100" dirty="0" err="1" smtClean="0">
-                <a:solidFill>
-                  <a:schemeClr val="accent3">
-                    <a:lumMod val="50000"/>
-                  </a:schemeClr>
-                </a:solidFill>
-              </a:rPr>
-              <a:t>bcdefghijklmnopqrstuvwxyz</a:t>
-            </a:r>
-            <a:endParaRPr lang="tr-TR" sz="4100" dirty="0" smtClean="0">
-              <a:solidFill>
-                <a:schemeClr val="accent3">
-                  <a:lumMod val="50000"/>
-                </a:schemeClr>
-              </a:solidFill>
-            </a:endParaRPr>
-          </a:p>
-          <a:p>
-            <a:pPr marL="342900" indent="-342900" algn="l">
-              <a:buFont typeface="Arial" pitchFamily="34" charset="0"/>
-              <a:buChar char="•"/>
-            </a:pPr>
-            <a:r>
-              <a:rPr lang="tr-TR" sz="4100" dirty="0" smtClean="0">
-                <a:solidFill>
-                  <a:schemeClr val="accent3">
-                    <a:lumMod val="50000"/>
-                  </a:schemeClr>
-                </a:solidFill>
-              </a:rPr>
-              <a:t>0123456789</a:t>
-            </a:r>
-          </a:p>
-          <a:p>
-            <a:pPr marL="342900" indent="-342900" algn="l">
-              <a:buFont typeface="Arial" pitchFamily="34" charset="0"/>
-              <a:buChar char="•"/>
-            </a:pPr>
-            <a:r>
-              <a:rPr lang="tr-TR" sz="4100" dirty="0" smtClean="0">
-                <a:solidFill>
-                  <a:schemeClr val="accent3">
-                    <a:lumMod val="50000"/>
-                  </a:schemeClr>
-                </a:solidFill>
-              </a:rPr>
-              <a:t>-._~:/?#[]@!$&amp;'()*+,;=</a:t>
-            </a:r>
-          </a:p>
-          <a:p>
-            <a:pPr marL="342900" indent="-342900" algn="l">
-              <a:buFont typeface="Arial" pitchFamily="34" charset="0"/>
-              <a:buChar char="•"/>
-            </a:pPr>
-            <a:r>
-              <a:rPr lang="tr-TR" sz="4100" dirty="0" smtClean="0">
-                <a:solidFill>
-                  <a:srgbClr val="C00000"/>
-                </a:solidFill>
-              </a:rPr>
-              <a:t>kaynak adı - «tire» ile başlayamaz</a:t>
-            </a:r>
-          </a:p>
-          <a:p>
-            <a:pPr algn="l"/>
-            <a:endParaRPr lang="tr-TR" sz="4000" dirty="0"/>
-          </a:p>
-        </p:txBody>
-      </p:sp>
-    </p:spTree>
-    <p:extLst>
-      <p:ext uri="{BB962C8B-B14F-4D97-AF65-F5344CB8AC3E}">
-        <p14:creationId xmlns:p14="http://schemas.microsoft.com/office/powerpoint/2010/main" val="3628597207"/>
-      </p:ext>
-    </p:extLst>
-  </p:cSld>
-  <p:clrMapOvr>
-    <a:masterClrMapping/>
-  </p:clrMapOvr>
-  <p:timing>
-    <p:tnLst>
-      <p:par>
-        <p:cTn id="1" dur="indefinite" restart="never" nodeType="tmRoot"/>
-      </p:par>
-    </p:tnLst>
-  </p:timing>
 </p:sld>
 </file>
 
@@ -22966,36 +23291,12 @@
               <a:rPr lang="tr-TR" b="1" dirty="0" smtClean="0"/>
             </a:br>
             <a:r>
-              <a:rPr lang="tr-TR" dirty="0" err="1" smtClean="0"/>
-              <a:t>url</a:t>
+              <a:rPr lang="tr-TR" dirty="0" smtClean="0"/>
+              <a:t>geçerli karakter kümesi</a:t>
             </a:r>
             <a:r>
               <a:rPr lang="tr-TR" b="1" dirty="0" smtClean="0"/>
               <a:t> </a:t>
-            </a:r>
-            <a:r>
-              <a:rPr lang="tr-TR" dirty="0" smtClean="0"/>
-              <a:t>kodlama</a:t>
-            </a:r>
-            <a:r>
-              <a:rPr lang="tr-TR" b="1" dirty="0" smtClean="0"/>
-              <a:t> (</a:t>
-            </a:r>
-            <a:r>
-              <a:rPr lang="tr-TR" b="1" dirty="0" err="1" smtClean="0"/>
-              <a:t>url</a:t>
-            </a:r>
-            <a:r>
-              <a:rPr lang="tr-TR" b="1" dirty="0" smtClean="0"/>
-              <a:t> </a:t>
-            </a:r>
-            <a:r>
-              <a:rPr lang="tr-TR" b="1" dirty="0" err="1" smtClean="0"/>
-              <a:t>encoding</a:t>
-            </a:r>
-            <a:r>
-              <a:rPr lang="tr-TR" b="1" dirty="0" smtClean="0"/>
-              <a:t>)</a:t>
             </a:r>
             <a:endParaRPr lang="tr-TR" dirty="0"/>
           </a:p>
@@ -23046,309 +23347,92 @@
             <a:r>
               <a:rPr lang="tr-TR" sz="4100" dirty="0" smtClean="0">
                 <a:solidFill>
-                  <a:srgbClr val="00B050"/>
-                </a:solidFill>
-              </a:rPr>
-              <a:t>A-Z</a:t>
-            </a:r>
-            <a:r>
-              <a:rPr lang="tr-TR" sz="4100" dirty="0" smtClean="0"/>
-              <a:t>, </a:t>
-            </a:r>
-            <a:r>
-              <a:rPr lang="tr-TR" sz="4100" dirty="0" smtClean="0">
-                <a:solidFill>
-                  <a:srgbClr val="00B050"/>
-                </a:solidFill>
-              </a:rPr>
-              <a:t>a-z</a:t>
-            </a:r>
-            <a:r>
-              <a:rPr lang="tr-TR" sz="4100" dirty="0" smtClean="0"/>
-              <a:t>, </a:t>
-            </a:r>
-            <a:r>
-              <a:rPr lang="tr-TR" sz="4100" dirty="0" smtClean="0">
-                <a:solidFill>
-                  <a:srgbClr val="00B050"/>
-                </a:solidFill>
-              </a:rPr>
-              <a:t>0-9</a:t>
-            </a:r>
-            <a:r>
-              <a:rPr lang="tr-TR" sz="4100" dirty="0" smtClean="0"/>
-              <a:t>, </a:t>
-            </a:r>
-            <a:r>
-              <a:rPr lang="tr-TR" sz="4100" dirty="0" smtClean="0">
-                <a:solidFill>
-                  <a:srgbClr val="00B050"/>
-                </a:solidFill>
-              </a:rPr>
-              <a:t>-._~:/?#[]@!$&amp;'()*+,;=</a:t>
-            </a:r>
-          </a:p>
-          <a:p>
-            <a:r>
-              <a:rPr lang="tr-TR" sz="2500" dirty="0" smtClean="0">
-                <a:solidFill>
-                  <a:srgbClr val="FF0000"/>
-                </a:solidFill>
-              </a:rPr>
-              <a:t>dışındaki tüm karakterler </a:t>
-            </a:r>
-            <a:r>
-              <a:rPr lang="tr-TR" sz="2500" dirty="0" smtClean="0">
-                <a:solidFill>
-                  <a:srgbClr val="00B050"/>
-                </a:solidFill>
-              </a:rPr>
-              <a:t>geçerli </a:t>
-            </a:r>
-            <a:r>
-              <a:rPr lang="tr-TR" sz="2500" dirty="0" err="1" smtClean="0">
-                <a:solidFill>
-                  <a:srgbClr val="00B050"/>
-                </a:solidFill>
-              </a:rPr>
-              <a:t>url</a:t>
-            </a:r>
-            <a:r>
-              <a:rPr lang="tr-TR" sz="2500" dirty="0" smtClean="0">
-                <a:solidFill>
-                  <a:srgbClr val="00B050"/>
-                </a:solidFill>
-              </a:rPr>
-              <a:t> karakterleriyle</a:t>
-            </a:r>
-            <a:r>
-              <a:rPr lang="tr-TR" sz="2500" dirty="0" smtClean="0">
-                <a:solidFill>
-                  <a:srgbClr val="FF0000"/>
-                </a:solidFill>
-              </a:rPr>
-              <a:t> kodlanır</a:t>
-            </a:r>
-          </a:p>
-          <a:p>
-            <a:endParaRPr lang="tr-TR" sz="2500" dirty="0" smtClean="0">
-              <a:solidFill>
-                <a:srgbClr val="FF0000"/>
-              </a:solidFill>
-            </a:endParaRPr>
-          </a:p>
-          <a:p>
-            <a:pPr marL="457200" indent="-457200" algn="l">
-              <a:buFont typeface="Arial" charset="0"/>
+                  <a:schemeClr val="accent3">
+                    <a:lumMod val="50000"/>
+                  </a:schemeClr>
+                </a:solidFill>
+              </a:rPr>
+              <a:t>ABCDEFGHIJKLMNOPQRSTUVWXYZ</a:t>
+            </a:r>
+          </a:p>
+          <a:p>
+            <a:pPr marL="342900" indent="-342900" algn="l">
+              <a:buFont typeface="Arial" pitchFamily="34" charset="0"/>
               <a:buChar char="•"/>
             </a:pPr>
             <a:r>
-              <a:rPr lang="tr-TR" sz="2500" dirty="0" smtClean="0"/>
-              <a:t>Boşluk karakteri </a:t>
-            </a:r>
-            <a:r>
-              <a:rPr lang="tr-TR" sz="2500" dirty="0" smtClean="0">
-                <a:solidFill>
-                  <a:srgbClr val="00B050"/>
-                </a:solidFill>
-              </a:rPr>
-              <a:t>+ </a:t>
-            </a:r>
-            <a:r>
-              <a:rPr lang="tr-TR" sz="2500" dirty="0" smtClean="0"/>
-              <a:t>veya </a:t>
-            </a:r>
-            <a:r>
-              <a:rPr lang="tr-TR" sz="2500" dirty="0" smtClean="0">
-                <a:solidFill>
-                  <a:srgbClr val="00B050"/>
-                </a:solidFill>
-              </a:rPr>
-              <a:t>%20 </a:t>
-            </a:r>
-            <a:r>
-              <a:rPr lang="tr-TR" sz="2500" dirty="0" smtClean="0"/>
-              <a:t>karakterleri ile değiştirilir.</a:t>
-            </a:r>
-          </a:p>
-          <a:p>
-            <a:pPr marL="457200" indent="-457200" algn="l">
-              <a:buFont typeface="Arial" charset="0"/>
-              <a:buChar char="•"/>
-            </a:pPr>
-            <a:endParaRPr lang="tr-TR" sz="2500" dirty="0" smtClean="0"/>
-          </a:p>
-          <a:p>
-            <a:pPr marL="457200" indent="-457200" algn="l">
-              <a:buFont typeface="Arial" charset="0"/>
-              <a:buChar char="•"/>
-            </a:pPr>
-            <a:r>
-              <a:rPr lang="tr-TR" sz="2500" dirty="0" err="1" smtClean="0"/>
-              <a:t>Javascript</a:t>
-            </a:r>
-            <a:r>
-              <a:rPr lang="tr-TR" sz="2500" dirty="0" smtClean="0"/>
-              <a:t> </a:t>
-            </a:r>
-            <a:r>
-              <a:rPr lang="tr-TR" sz="2500" dirty="0" err="1" smtClean="0">
-                <a:solidFill>
-                  <a:schemeClr val="accent2">
+              <a:rPr lang="tr-TR" sz="4100" dirty="0" err="1">
+                <a:solidFill>
+                  <a:schemeClr val="accent3">
                     <a:lumMod val="50000"/>
                   </a:schemeClr>
                 </a:solidFill>
               </a:rPr>
-              <a:t>encodeURI</a:t>
-            </a:r>
-            <a:r>
-              <a:rPr lang="tr-TR" sz="2500" dirty="0" smtClean="0">
-                <a:solidFill>
-                  <a:schemeClr val="accent2">
+              <a:t>a</a:t>
+            </a:r>
+            <a:r>
+              <a:rPr lang="tr-TR" sz="4100" dirty="0" err="1" smtClean="0">
+                <a:solidFill>
+                  <a:schemeClr val="accent3">
                     <a:lumMod val="50000"/>
                   </a:schemeClr>
                 </a:solidFill>
               </a:rPr>
-              <a:t>()</a:t>
-            </a:r>
-            <a:r>
-              <a:rPr lang="tr-TR" sz="2500" dirty="0" smtClean="0"/>
-              <a:t> «güvenli kodlanmış» </a:t>
-            </a:r>
-            <a:r>
-              <a:rPr lang="tr-TR" sz="2500" dirty="0" err="1" smtClean="0"/>
-              <a:t>url</a:t>
-            </a:r>
-            <a:r>
-              <a:rPr lang="tr-TR" sz="2500" dirty="0" smtClean="0"/>
-              <a:t> oluşturur</a:t>
-            </a:r>
-          </a:p>
-          <a:p>
-            <a:pPr marL="457200" indent="-457200" algn="l">
-              <a:buFont typeface="Arial" charset="0"/>
-              <a:buChar char="•"/>
-            </a:pPr>
-            <a:endParaRPr lang="tr-TR" sz="2500" dirty="0" smtClean="0"/>
-          </a:p>
-          <a:p>
-            <a:pPr marL="457200" indent="-457200" algn="l">
-              <a:buFont typeface="Arial" charset="0"/>
-              <a:buChar char="•"/>
-            </a:pPr>
-            <a:r>
-              <a:rPr lang="en-US" sz="2600" dirty="0" err="1">
-                <a:solidFill>
-                  <a:schemeClr val="accent2">
-                    <a:lumMod val="50000"/>
-                  </a:schemeClr>
-                </a:solidFill>
-              </a:rPr>
-              <a:t>encodeURI</a:t>
-            </a:r>
-            <a:r>
-              <a:rPr lang="en-US" sz="2600" dirty="0">
-                <a:solidFill>
-                  <a:schemeClr val="accent2">
-                    <a:lumMod val="50000"/>
-                  </a:schemeClr>
-                </a:solidFill>
-              </a:rPr>
-              <a:t>(</a:t>
-            </a:r>
-            <a:r>
-              <a:rPr lang="en-US" sz="2600" dirty="0">
-                <a:solidFill>
-                  <a:schemeClr val="tx2">
-                    <a:lumMod val="60000"/>
-                    <a:lumOff val="40000"/>
-                  </a:schemeClr>
-                </a:solidFill>
-              </a:rPr>
-              <a:t>"http://www.google.com/a file with spaces.html</a:t>
-            </a:r>
-            <a:r>
-              <a:rPr lang="en-US" sz="2600" dirty="0" smtClean="0">
-                <a:solidFill>
-                  <a:schemeClr val="tx2">
-                    <a:lumMod val="60000"/>
-                    <a:lumOff val="40000"/>
-                  </a:schemeClr>
-                </a:solidFill>
-              </a:rPr>
-              <a:t>"</a:t>
-            </a:r>
-            <a:r>
-              <a:rPr lang="en-US" sz="2600" dirty="0" smtClean="0">
-                <a:solidFill>
-                  <a:schemeClr val="accent2">
-                    <a:lumMod val="50000"/>
-                  </a:schemeClr>
-                </a:solidFill>
-              </a:rPr>
-              <a:t>)</a:t>
-            </a:r>
-            <a:endParaRPr lang="tr-TR" sz="2600" dirty="0" smtClean="0">
+              <a:t>bcdefghijklmnopqrstuvwxyz</a:t>
+            </a:r>
+            <a:endParaRPr lang="tr-TR" sz="4100" dirty="0" smtClean="0">
               <a:solidFill>
-                <a:schemeClr val="accent2">
+                <a:schemeClr val="accent3">
                   <a:lumMod val="50000"/>
                 </a:schemeClr>
               </a:solidFill>
             </a:endParaRPr>
           </a:p>
           <a:p>
-            <a:pPr marL="457200" indent="-457200" algn="l">
-              <a:buFont typeface="Arial" charset="0"/>
+            <a:pPr marL="342900" indent="-342900" algn="l">
+              <a:buFont typeface="Arial" pitchFamily="34" charset="0"/>
               <a:buChar char="•"/>
             </a:pPr>
-            <a:endParaRPr lang="tr-TR" sz="2600" dirty="0" smtClean="0">
-              <a:solidFill>
-                <a:schemeClr val="accent2">
-                  <a:lumMod val="50000"/>
-                </a:schemeClr>
-              </a:solidFill>
-            </a:endParaRPr>
-          </a:p>
-          <a:p>
-            <a:pPr marL="457200" indent="-457200" algn="l">
-              <a:buFont typeface="Arial" charset="0"/>
+            <a:r>
+              <a:rPr lang="tr-TR" sz="4100" dirty="0" smtClean="0">
+                <a:solidFill>
+                  <a:schemeClr val="accent3">
+                    <a:lumMod val="50000"/>
+                  </a:schemeClr>
+                </a:solidFill>
+              </a:rPr>
+              <a:t>0123456789</a:t>
+            </a:r>
+          </a:p>
+          <a:p>
+            <a:pPr marL="342900" indent="-342900" algn="l">
+              <a:buFont typeface="Arial" pitchFamily="34" charset="0"/>
               <a:buChar char="•"/>
             </a:pPr>
             <a:r>
-              <a:rPr lang="tr-TR" sz="2600" dirty="0">
-                <a:solidFill>
-                  <a:schemeClr val="tx2">
-                    <a:lumMod val="60000"/>
-                    <a:lumOff val="40000"/>
-                  </a:schemeClr>
-                </a:solidFill>
-              </a:rPr>
-              <a:t>http://www.google.com/a%20file%20with%20spaces.html</a:t>
-            </a:r>
-            <a:endParaRPr lang="tr-TR" sz="2600" dirty="0" smtClean="0">
-              <a:solidFill>
-                <a:schemeClr val="tx2">
-                  <a:lumMod val="60000"/>
-                  <a:lumOff val="40000"/>
-                </a:schemeClr>
-              </a:solidFill>
-            </a:endParaRPr>
-          </a:p>
-          <a:p>
-            <a:pPr algn="l"/>
-            <a:endParaRPr lang="tr-TR" sz="3300" dirty="0">
-              <a:solidFill>
-                <a:srgbClr val="00B050"/>
-              </a:solidFill>
-            </a:endParaRPr>
-          </a:p>
-          <a:p>
-            <a:pPr algn="l"/>
-            <a:endParaRPr lang="tr-TR" sz="3300" dirty="0" smtClean="0">
-              <a:solidFill>
-                <a:srgbClr val="00B050"/>
-              </a:solidFill>
-            </a:endParaRPr>
+              <a:rPr lang="tr-TR" sz="4100" dirty="0" smtClean="0">
+                <a:solidFill>
+                  <a:schemeClr val="accent3">
+                    <a:lumMod val="50000"/>
+                  </a:schemeClr>
+                </a:solidFill>
+              </a:rPr>
+              <a:t>-._~:/?#[]@!$&amp;'()*+,;=</a:t>
+            </a:r>
+          </a:p>
+          <a:p>
+            <a:pPr marL="342900" indent="-342900" algn="l">
+              <a:buFont typeface="Arial" pitchFamily="34" charset="0"/>
+              <a:buChar char="•"/>
+            </a:pPr>
+            <a:r>
+              <a:rPr lang="tr-TR" sz="4100" dirty="0" smtClean="0">
+                <a:solidFill>
+                  <a:srgbClr val="C00000"/>
+                </a:solidFill>
+              </a:rPr>
+              <a:t>kaynak adı - «tire» ile başlayamaz</a:t>
+            </a:r>
           </a:p>
           <a:p>
             <a:pPr algn="l"/>
@@ -23359,7 +23443,7 @@
     </p:spTree>
     <p:extLst>
       <p:ext uri="{BB962C8B-B14F-4D97-AF65-F5344CB8AC3E}">
-        <p14:creationId xmlns:p14="http://schemas.microsoft.com/office/powerpoint/2010/main" val="2955180758"/>
+        <p14:creationId xmlns:p14="http://schemas.microsoft.com/office/powerpoint/2010/main" val="3628597207"/>
       </p:ext>
     </p:extLst>
   </p:cSld>
@@ -23395,6 +23479,636 @@
       </p:grpSpPr>
       <p:sp>
         <p:nvSpPr>
+          <p:cNvPr id="5" name="İçerik Yer Tutucusu 2"/>
+          <p:cNvSpPr txBox="1">
+            <a:spLocks/>
+          </p:cNvSpPr>
+          <p:nvPr/>
+        </p:nvSpPr>
+        <p:spPr>
+          <a:xfrm>
+            <a:off x="179512" y="1700809"/>
+            <a:ext cx="8867328" cy="4953018"/>
+          </a:xfrm>
+          <a:prstGeom prst="rect">
+            <a:avLst/>
+          </a:prstGeom>
+        </p:spPr>
+        <p:txBody>
+          <a:bodyPr vert="horz" lIns="91440" tIns="45720" rIns="91440" bIns="45720" rtlCol="0">
+            <a:normAutofit/>
+          </a:bodyPr>
+          <a:lstStyle>
+            <a:lvl1pPr marL="342900" indent="-342900" algn="l" defTabSz="914400" rtl="0" eaLnBrk="1" latinLnBrk="0" hangingPunct="1">
+              <a:spcBef>
+                <a:spcPct val="20000"/>
+              </a:spcBef>
+              <a:buFont typeface="Arial" pitchFamily="34" charset="0"/>
+              <a:buChar char="•"/>
+              <a:defRPr sz="3200" kern="1200">
+                <a:solidFill>
+                  <a:schemeClr val="tx1"/>
+                </a:solidFill>
+                <a:latin typeface="+mn-lt"/>
+                <a:ea typeface="+mn-ea"/>
+                <a:cs typeface="+mn-cs"/>
+              </a:defRPr>
+            </a:lvl1pPr>
+            <a:lvl2pPr marL="742950" indent="-285750" algn="l" defTabSz="914400" rtl="0" eaLnBrk="1" latinLnBrk="0" hangingPunct="1">
+              <a:spcBef>
+                <a:spcPct val="20000"/>
+              </a:spcBef>
+              <a:buFont typeface="Arial" pitchFamily="34" charset="0"/>
+              <a:buChar char="–"/>
+              <a:defRPr sz="2800" kern="1200">
+                <a:solidFill>
+                  <a:schemeClr val="tx1"/>
+                </a:solidFill>
+                <a:latin typeface="+mn-lt"/>
+                <a:ea typeface="+mn-ea"/>
+                <a:cs typeface="+mn-cs"/>
+              </a:defRPr>
+            </a:lvl2pPr>
+            <a:lvl3pPr marL="1143000" indent="-228600" algn="l" defTabSz="914400" rtl="0" eaLnBrk="1" latinLnBrk="0" hangingPunct="1">
+              <a:spcBef>
+                <a:spcPct val="20000"/>
+              </a:spcBef>
+              <a:buFont typeface="Arial" pitchFamily="34" charset="0"/>
+              <a:buChar char="•"/>
+              <a:defRPr sz="2400" kern="1200">
+                <a:solidFill>
+                  <a:schemeClr val="tx1"/>
+                </a:solidFill>
+                <a:latin typeface="+mn-lt"/>
+                <a:ea typeface="+mn-ea"/>
+                <a:cs typeface="+mn-cs"/>
+              </a:defRPr>
+            </a:lvl3pPr>
+            <a:lvl4pPr marL="1600200" indent="-228600" algn="l" defTabSz="914400" rtl="0" eaLnBrk="1" latinLnBrk="0" hangingPunct="1">
+              <a:spcBef>
+                <a:spcPct val="20000"/>
+              </a:spcBef>
+              <a:buFont typeface="Arial" pitchFamily="34" charset="0"/>
+              <a:buChar char="–"/>
+              <a:defRPr sz="2000" kern="1200">
+                <a:solidFill>
+                  <a:schemeClr val="tx1"/>
+                </a:solidFill>
+                <a:latin typeface="+mn-lt"/>
+                <a:ea typeface="+mn-ea"/>
+                <a:cs typeface="+mn-cs"/>
+              </a:defRPr>
+            </a:lvl4pPr>
+            <a:lvl5pPr marL="2057400" indent="-228600" algn="l" defTabSz="914400" rtl="0" eaLnBrk="1" latinLnBrk="0" hangingPunct="1">
+              <a:spcBef>
+                <a:spcPct val="20000"/>
+              </a:spcBef>
+              <a:buFont typeface="Arial" pitchFamily="34" charset="0"/>
+              <a:buChar char="»"/>
+              <a:defRPr sz="2000" kern="1200">
+                <a:solidFill>
+                  <a:schemeClr val="tx1"/>
+                </a:solidFill>
+                <a:latin typeface="+mn-lt"/>
+                <a:ea typeface="+mn-ea"/>
+                <a:cs typeface="+mn-cs"/>
+              </a:defRPr>
+            </a:lvl5pPr>
+            <a:lvl6pPr marL="2514600" indent="-228600" algn="l" defTabSz="914400" rtl="0" eaLnBrk="1" latinLnBrk="0" hangingPunct="1">
+              <a:spcBef>
+                <a:spcPct val="20000"/>
+              </a:spcBef>
+              <a:buFont typeface="Arial" pitchFamily="34" charset="0"/>
+              <a:buChar char="•"/>
+              <a:defRPr sz="2000" kern="1200">
+                <a:solidFill>
+                  <a:schemeClr val="tx1"/>
+                </a:solidFill>
+                <a:latin typeface="+mn-lt"/>
+                <a:ea typeface="+mn-ea"/>
+                <a:cs typeface="+mn-cs"/>
+              </a:defRPr>
+            </a:lvl6pPr>
+            <a:lvl7pPr marL="2971800" indent="-228600" algn="l" defTabSz="914400" rtl="0" eaLnBrk="1" latinLnBrk="0" hangingPunct="1">
+              <a:spcBef>
+                <a:spcPct val="20000"/>
+              </a:spcBef>
+              <a:buFont typeface="Arial" pitchFamily="34" charset="0"/>
+              <a:buChar char="•"/>
+              <a:defRPr sz="2000" kern="1200">
+                <a:solidFill>
+                  <a:schemeClr val="tx1"/>
+                </a:solidFill>
+                <a:latin typeface="+mn-lt"/>
+                <a:ea typeface="+mn-ea"/>
+                <a:cs typeface="+mn-cs"/>
+              </a:defRPr>
+            </a:lvl7pPr>
+            <a:lvl8pPr marL="3429000" indent="-228600" algn="l" defTabSz="914400" rtl="0" eaLnBrk="1" latinLnBrk="0" hangingPunct="1">
+              <a:spcBef>
+                <a:spcPct val="20000"/>
+              </a:spcBef>
+              <a:buFont typeface="Arial" pitchFamily="34" charset="0"/>
+              <a:buChar char="•"/>
+              <a:defRPr sz="2000" kern="1200">
+                <a:solidFill>
+                  <a:schemeClr val="tx1"/>
+                </a:solidFill>
+                <a:latin typeface="+mn-lt"/>
+                <a:ea typeface="+mn-ea"/>
+                <a:cs typeface="+mn-cs"/>
+              </a:defRPr>
+            </a:lvl8pPr>
+            <a:lvl9pPr marL="3886200" indent="-228600" algn="l" defTabSz="914400" rtl="0" eaLnBrk="1" latinLnBrk="0" hangingPunct="1">
+              <a:spcBef>
+                <a:spcPct val="20000"/>
+              </a:spcBef>
+              <a:buFont typeface="Arial" pitchFamily="34" charset="0"/>
+              <a:buChar char="•"/>
+              <a:defRPr sz="2000" kern="1200">
+                <a:solidFill>
+                  <a:schemeClr val="tx1"/>
+                </a:solidFill>
+                <a:latin typeface="+mn-lt"/>
+                <a:ea typeface="+mn-ea"/>
+                <a:cs typeface="+mn-cs"/>
+              </a:defRPr>
+            </a:lvl9pPr>
+          </a:lstStyle>
+          <a:p>
+            <a:pPr marL="0" indent="0">
+              <a:buFont typeface="Arial" pitchFamily="34" charset="0"/>
+              <a:buNone/>
+            </a:pPr>
+            <a:endParaRPr lang="tr-TR" b="1" dirty="0" smtClean="0">
+              <a:solidFill>
+                <a:schemeClr val="accent3">
+                  <a:lumMod val="75000"/>
+                </a:schemeClr>
+              </a:solidFill>
+            </a:endParaRPr>
+          </a:p>
+        </p:txBody>
+      </p:sp>
+      <p:sp>
+        <p:nvSpPr>
+          <p:cNvPr id="10" name="Başlık 1"/>
+          <p:cNvSpPr>
+            <a:spLocks noGrp="1"/>
+          </p:cNvSpPr>
+          <p:nvPr>
+            <p:ph type="title"/>
+          </p:nvPr>
+        </p:nvSpPr>
+        <p:spPr>
+          <a:xfrm>
+            <a:off x="457200" y="274638"/>
+            <a:ext cx="8229600" cy="1143000"/>
+          </a:xfrm>
+        </p:spPr>
+        <p:txBody>
+          <a:bodyPr>
+            <a:normAutofit fontScale="90000"/>
+          </a:bodyPr>
+          <a:lstStyle/>
+          <a:p>
+            <a:r>
+              <a:rPr lang="tr-TR" b="1" dirty="0" smtClean="0"/>
+              <a:t>URL</a:t>
+            </a:r>
+            <a:br>
+              <a:rPr lang="tr-TR" b="1" dirty="0" smtClean="0"/>
+            </a:br>
+            <a:r>
+              <a:rPr lang="tr-TR" dirty="0" err="1" smtClean="0"/>
+              <a:t>url</a:t>
+            </a:r>
+            <a:r>
+              <a:rPr lang="tr-TR" b="1" dirty="0" smtClean="0"/>
+              <a:t> </a:t>
+            </a:r>
+            <a:r>
+              <a:rPr lang="tr-TR" dirty="0" smtClean="0"/>
+              <a:t>kodlama</a:t>
+            </a:r>
+            <a:r>
+              <a:rPr lang="tr-TR" b="1" dirty="0" smtClean="0"/>
+              <a:t> (</a:t>
+            </a:r>
+            <a:r>
+              <a:rPr lang="tr-TR" b="1" dirty="0" err="1" smtClean="0"/>
+              <a:t>url</a:t>
+            </a:r>
+            <a:r>
+              <a:rPr lang="tr-TR" b="1" dirty="0" smtClean="0"/>
+              <a:t> </a:t>
+            </a:r>
+            <a:r>
+              <a:rPr lang="tr-TR" b="1" dirty="0" err="1" smtClean="0"/>
+              <a:t>encoding</a:t>
+            </a:r>
+            <a:r>
+              <a:rPr lang="tr-TR" b="1" dirty="0" smtClean="0"/>
+              <a:t>)</a:t>
+            </a:r>
+            <a:endParaRPr lang="tr-TR" dirty="0"/>
+          </a:p>
+        </p:txBody>
+      </p:sp>
+      <p:sp>
+        <p:nvSpPr>
+          <p:cNvPr id="11" name="Başlık 1"/>
+          <p:cNvSpPr txBox="1">
+            <a:spLocks/>
+          </p:cNvSpPr>
+          <p:nvPr/>
+        </p:nvSpPr>
+        <p:spPr>
+          <a:xfrm>
+            <a:off x="292696" y="1806180"/>
+            <a:ext cx="8640960" cy="4742275"/>
+          </a:xfrm>
+          <a:prstGeom prst="rect">
+            <a:avLst/>
+          </a:prstGeom>
+        </p:spPr>
+        <p:txBody>
+          <a:bodyPr vert="horz" lIns="91440" tIns="45720" rIns="91440" bIns="45720" rtlCol="0" anchor="t">
+            <a:normAutofit fontScale="97500"/>
+          </a:bodyPr>
+          <a:lstStyle>
+            <a:lvl1pPr algn="ctr" defTabSz="914400" rtl="0" eaLnBrk="1" latinLnBrk="0" hangingPunct="1">
+              <a:spcBef>
+                <a:spcPct val="0"/>
+              </a:spcBef>
+              <a:buNone/>
+              <a:defRPr sz="4400" kern="1200">
+                <a:solidFill>
+                  <a:schemeClr val="tx1"/>
+                </a:solidFill>
+                <a:latin typeface="+mj-lt"/>
+                <a:ea typeface="+mj-ea"/>
+                <a:cs typeface="+mj-cs"/>
+              </a:defRPr>
+            </a:lvl1pPr>
+          </a:lstStyle>
+          <a:p>
+            <a:pPr marL="342900" indent="-342900" algn="l">
+              <a:buFont typeface="Arial" pitchFamily="34" charset="0"/>
+              <a:buChar char="•"/>
+            </a:pPr>
+            <a:r>
+              <a:rPr lang="tr-TR" sz="4100" dirty="0" smtClean="0">
+                <a:solidFill>
+                  <a:srgbClr val="00B050"/>
+                </a:solidFill>
+              </a:rPr>
+              <a:t>A-Z</a:t>
+            </a:r>
+            <a:r>
+              <a:rPr lang="tr-TR" sz="4100" dirty="0" smtClean="0"/>
+              <a:t>, </a:t>
+            </a:r>
+            <a:r>
+              <a:rPr lang="tr-TR" sz="4100" dirty="0" smtClean="0">
+                <a:solidFill>
+                  <a:srgbClr val="00B050"/>
+                </a:solidFill>
+              </a:rPr>
+              <a:t>a-z</a:t>
+            </a:r>
+            <a:r>
+              <a:rPr lang="tr-TR" sz="4100" dirty="0" smtClean="0"/>
+              <a:t>, </a:t>
+            </a:r>
+            <a:r>
+              <a:rPr lang="tr-TR" sz="4100" dirty="0" smtClean="0">
+                <a:solidFill>
+                  <a:srgbClr val="00B050"/>
+                </a:solidFill>
+              </a:rPr>
+              <a:t>0-9</a:t>
+            </a:r>
+            <a:r>
+              <a:rPr lang="tr-TR" sz="4100" dirty="0" smtClean="0"/>
+              <a:t>, </a:t>
+            </a:r>
+            <a:r>
+              <a:rPr lang="tr-TR" sz="4100" dirty="0" smtClean="0">
+                <a:solidFill>
+                  <a:srgbClr val="00B050"/>
+                </a:solidFill>
+              </a:rPr>
+              <a:t>-._~:/?#[]@!$&amp;'()*+,;=</a:t>
+            </a:r>
+          </a:p>
+          <a:p>
+            <a:r>
+              <a:rPr lang="tr-TR" sz="2500" dirty="0" smtClean="0">
+                <a:solidFill>
+                  <a:srgbClr val="FF0000"/>
+                </a:solidFill>
+              </a:rPr>
+              <a:t>dışındaki tüm karakterler </a:t>
+            </a:r>
+            <a:r>
+              <a:rPr lang="tr-TR" sz="2500" dirty="0" smtClean="0">
+                <a:solidFill>
+                  <a:srgbClr val="00B050"/>
+                </a:solidFill>
+              </a:rPr>
+              <a:t>geçerli </a:t>
+            </a:r>
+            <a:r>
+              <a:rPr lang="tr-TR" sz="2500" dirty="0" err="1" smtClean="0">
+                <a:solidFill>
+                  <a:srgbClr val="00B050"/>
+                </a:solidFill>
+              </a:rPr>
+              <a:t>url</a:t>
+            </a:r>
+            <a:r>
+              <a:rPr lang="tr-TR" sz="2500" dirty="0" smtClean="0">
+                <a:solidFill>
+                  <a:srgbClr val="00B050"/>
+                </a:solidFill>
+              </a:rPr>
+              <a:t> karakterleriyle</a:t>
+            </a:r>
+            <a:r>
+              <a:rPr lang="tr-TR" sz="2500" dirty="0" smtClean="0">
+                <a:solidFill>
+                  <a:srgbClr val="FF0000"/>
+                </a:solidFill>
+              </a:rPr>
+              <a:t> kodlanır</a:t>
+            </a:r>
+          </a:p>
+          <a:p>
+            <a:endParaRPr lang="tr-TR" sz="2500" dirty="0" smtClean="0">
+              <a:solidFill>
+                <a:srgbClr val="FF0000"/>
+              </a:solidFill>
+            </a:endParaRPr>
+          </a:p>
+          <a:p>
+            <a:pPr marL="457200" indent="-457200" algn="l">
+              <a:buFont typeface="Arial" charset="0"/>
+              <a:buChar char="•"/>
+            </a:pPr>
+            <a:r>
+              <a:rPr lang="tr-TR" sz="2500" dirty="0" smtClean="0"/>
+              <a:t>Boşluk karakteri </a:t>
+            </a:r>
+            <a:r>
+              <a:rPr lang="tr-TR" sz="2500" dirty="0" smtClean="0">
+                <a:solidFill>
+                  <a:srgbClr val="00B050"/>
+                </a:solidFill>
+              </a:rPr>
+              <a:t>+ </a:t>
+            </a:r>
+            <a:r>
+              <a:rPr lang="tr-TR" sz="2500" dirty="0" smtClean="0"/>
+              <a:t>veya </a:t>
+            </a:r>
+            <a:r>
+              <a:rPr lang="tr-TR" sz="2500" dirty="0" smtClean="0">
+                <a:solidFill>
+                  <a:srgbClr val="00B050"/>
+                </a:solidFill>
+              </a:rPr>
+              <a:t>%20 </a:t>
+            </a:r>
+            <a:r>
+              <a:rPr lang="tr-TR" sz="2500" dirty="0" smtClean="0"/>
+              <a:t>karakterleri ile değiştirilir.</a:t>
+            </a:r>
+          </a:p>
+          <a:p>
+            <a:pPr marL="457200" indent="-457200" algn="l">
+              <a:buFont typeface="Arial" charset="0"/>
+              <a:buChar char="•"/>
+            </a:pPr>
+            <a:endParaRPr lang="tr-TR" sz="2500" dirty="0" smtClean="0"/>
+          </a:p>
+          <a:p>
+            <a:pPr marL="457200" indent="-457200" algn="l">
+              <a:buFont typeface="Arial" charset="0"/>
+              <a:buChar char="•"/>
+            </a:pPr>
+            <a:r>
+              <a:rPr lang="tr-TR" sz="2500" dirty="0" err="1" smtClean="0"/>
+              <a:t>Javascript</a:t>
+            </a:r>
+            <a:r>
+              <a:rPr lang="tr-TR" sz="2500" dirty="0" smtClean="0"/>
+              <a:t> </a:t>
+            </a:r>
+            <a:r>
+              <a:rPr lang="tr-TR" sz="2500" dirty="0" err="1" smtClean="0">
+                <a:solidFill>
+                  <a:schemeClr val="accent2">
+                    <a:lumMod val="50000"/>
+                  </a:schemeClr>
+                </a:solidFill>
+              </a:rPr>
+              <a:t>encodeURI</a:t>
+            </a:r>
+            <a:r>
+              <a:rPr lang="tr-TR" sz="2500" dirty="0" smtClean="0">
+                <a:solidFill>
+                  <a:schemeClr val="accent2">
+                    <a:lumMod val="50000"/>
+                  </a:schemeClr>
+                </a:solidFill>
+              </a:rPr>
+              <a:t>()</a:t>
+            </a:r>
+            <a:r>
+              <a:rPr lang="tr-TR" sz="2500" dirty="0" smtClean="0"/>
+              <a:t> «güvenli kodlanmış» </a:t>
+            </a:r>
+            <a:r>
+              <a:rPr lang="tr-TR" sz="2500" dirty="0" err="1" smtClean="0"/>
+              <a:t>url</a:t>
+            </a:r>
+            <a:r>
+              <a:rPr lang="tr-TR" sz="2500" dirty="0" smtClean="0"/>
+              <a:t> oluşturur</a:t>
+            </a:r>
+          </a:p>
+          <a:p>
+            <a:pPr marL="457200" indent="-457200" algn="l">
+              <a:buFont typeface="Arial" charset="0"/>
+              <a:buChar char="•"/>
+            </a:pPr>
+            <a:endParaRPr lang="tr-TR" sz="2500" dirty="0" smtClean="0"/>
+          </a:p>
+          <a:p>
+            <a:pPr marL="457200" indent="-457200" algn="l">
+              <a:buFont typeface="Arial" charset="0"/>
+              <a:buChar char="•"/>
+            </a:pPr>
+            <a:r>
+              <a:rPr lang="en-US" sz="2600" dirty="0" err="1">
+                <a:solidFill>
+                  <a:schemeClr val="accent2">
+                    <a:lumMod val="50000"/>
+                  </a:schemeClr>
+                </a:solidFill>
+              </a:rPr>
+              <a:t>encodeURI</a:t>
+            </a:r>
+            <a:r>
+              <a:rPr lang="en-US" sz="2600" dirty="0">
+                <a:solidFill>
+                  <a:schemeClr val="accent2">
+                    <a:lumMod val="50000"/>
+                  </a:schemeClr>
+                </a:solidFill>
+              </a:rPr>
+              <a:t>(</a:t>
+            </a:r>
+            <a:r>
+              <a:rPr lang="en-US" sz="2600" dirty="0">
+                <a:solidFill>
+                  <a:schemeClr val="tx2">
+                    <a:lumMod val="60000"/>
+                    <a:lumOff val="40000"/>
+                  </a:schemeClr>
+                </a:solidFill>
+              </a:rPr>
+              <a:t>"http://www.google.com/a file with spaces.html</a:t>
+            </a:r>
+            <a:r>
+              <a:rPr lang="en-US" sz="2600" dirty="0" smtClean="0">
+                <a:solidFill>
+                  <a:schemeClr val="tx2">
+                    <a:lumMod val="60000"/>
+                    <a:lumOff val="40000"/>
+                  </a:schemeClr>
+                </a:solidFill>
+              </a:rPr>
+              <a:t>"</a:t>
+            </a:r>
+            <a:r>
+              <a:rPr lang="en-US" sz="2600" dirty="0" smtClean="0">
+                <a:solidFill>
+                  <a:schemeClr val="accent2">
+                    <a:lumMod val="50000"/>
+                  </a:schemeClr>
+                </a:solidFill>
+              </a:rPr>
+              <a:t>)</a:t>
+            </a:r>
+            <a:endParaRPr lang="tr-TR" sz="2600" dirty="0" smtClean="0">
+              <a:solidFill>
+                <a:schemeClr val="accent2">
+                  <a:lumMod val="50000"/>
+                </a:schemeClr>
+              </a:solidFill>
+            </a:endParaRPr>
+          </a:p>
+          <a:p>
+            <a:pPr marL="457200" indent="-457200" algn="l">
+              <a:buFont typeface="Arial" charset="0"/>
+              <a:buChar char="•"/>
+            </a:pPr>
+            <a:endParaRPr lang="tr-TR" sz="2600" dirty="0" smtClean="0">
+              <a:solidFill>
+                <a:schemeClr val="accent2">
+                  <a:lumMod val="50000"/>
+                </a:schemeClr>
+              </a:solidFill>
+            </a:endParaRPr>
+          </a:p>
+          <a:p>
+            <a:pPr marL="457200" indent="-457200" algn="l">
+              <a:buFont typeface="Arial" charset="0"/>
+              <a:buChar char="•"/>
+            </a:pPr>
+            <a:r>
+              <a:rPr lang="tr-TR" sz="2600" dirty="0">
+                <a:solidFill>
+                  <a:schemeClr val="tx2">
+                    <a:lumMod val="60000"/>
+                    <a:lumOff val="40000"/>
+                  </a:schemeClr>
+                </a:solidFill>
+              </a:rPr>
+              <a:t>http://www.google.com/a%20file%20with%20spaces.html</a:t>
+            </a:r>
+            <a:endParaRPr lang="tr-TR" sz="2600" dirty="0" smtClean="0">
+              <a:solidFill>
+                <a:schemeClr val="tx2">
+                  <a:lumMod val="60000"/>
+                  <a:lumOff val="40000"/>
+                </a:schemeClr>
+              </a:solidFill>
+            </a:endParaRPr>
+          </a:p>
+          <a:p>
+            <a:pPr algn="l"/>
+            <a:endParaRPr lang="tr-TR" sz="3300" dirty="0">
+              <a:solidFill>
+                <a:srgbClr val="00B050"/>
+              </a:solidFill>
+            </a:endParaRPr>
+          </a:p>
+          <a:p>
+            <a:pPr algn="l"/>
+            <a:endParaRPr lang="tr-TR" sz="3300" dirty="0" smtClean="0">
+              <a:solidFill>
+                <a:srgbClr val="00B050"/>
+              </a:solidFill>
+            </a:endParaRPr>
+          </a:p>
+          <a:p>
+            <a:pPr algn="l"/>
+            <a:endParaRPr lang="tr-TR" sz="4000" dirty="0"/>
+          </a:p>
+        </p:txBody>
+      </p:sp>
+    </p:spTree>
+    <p:extLst>
+      <p:ext uri="{BB962C8B-B14F-4D97-AF65-F5344CB8AC3E}">
+        <p14:creationId xmlns:p14="http://schemas.microsoft.com/office/powerpoint/2010/main" val="2955180758"/>
+      </p:ext>
+    </p:extLst>
+  </p:cSld>
+  <p:clrMapOvr>
+    <a:masterClrMapping/>
+  </p:clrMapOvr>
+  <p:timing>
+    <p:tnLst>
+      <p:par>
+        <p:cTn id="1" dur="indefinite" restart="never" nodeType="tmRoot"/>
+      </p:par>
+    </p:tnLst>
+  </p:timing>
+</p:sld>
+</file>
+
+<file path=ppt/slides/slide32.xml><?xml version="1.0" encoding="utf-8"?>
+<p:sld xmlns:a="http://schemas.openxmlformats.org/drawingml/2006/main" xmlns:r="http://schemas.openxmlformats.org/officeDocument/2006/relationships" xmlns:p="http://schemas.openxmlformats.org/presentationml/2006/main">
+  <p:cSld>
+    <p:spTree>
+      <p:nvGrpSpPr>
+        <p:cNvPr id="1" name=""/>
+        <p:cNvGrpSpPr/>
+        <p:nvPr/>
+      </p:nvGrpSpPr>
+      <p:grpSpPr>
+        <a:xfrm>
+          <a:off x="0" y="0"/>
+          <a:ext cx="0" cy="0"/>
+          <a:chOff x="0" y="0"/>
+          <a:chExt cx="0" cy="0"/>
+        </a:xfrm>
+      </p:grpSpPr>
+      <p:sp>
+        <p:nvSpPr>
           <p:cNvPr id="4" name="Başlık 1"/>
           <p:cNvSpPr txBox="1">
             <a:spLocks/>
@@ -23678,7 +24392,7 @@
 </p:sld>
 </file>
 
-<file path=ppt/slides/slide32.xml><?xml version="1.0" encoding="utf-8"?>
+<file path=ppt/slides/slide33.xml><?xml version="1.0" encoding="utf-8"?>
 <p:sld xmlns:a="http://schemas.openxmlformats.org/drawingml/2006/main" xmlns:r="http://schemas.openxmlformats.org/officeDocument/2006/relationships" xmlns:p="http://schemas.openxmlformats.org/presentationml/2006/main">
   <p:cSld>
     <p:spTree>

</xml_diff>